<commit_message>
Add remark on GPGPU code generation
</commit_message>
<xml_diff>
--- a/Python/python_hpc_numba.pptx
+++ b/Python/python_hpc_numba.pptx
@@ -4095,7 +4095,9 @@
         </p:nvSpPr>
         <p:spPr/>
         <p:txBody>
-          <a:bodyPr/>
+          <a:bodyPr>
+            <a:normAutofit fontScale="92500" lnSpcReduction="10000"/>
+          </a:bodyPr>
           <a:lstStyle/>
           <a:p>
             <a:r>
@@ -4118,11 +4120,7 @@
             <a:pPr lvl="1"/>
             <a:r>
               <a:rPr lang="en-US" dirty="0" smtClean="0"/>
-              <a:t>fully automatic and </a:t>
-            </a:r>
-            <a:r>
-              <a:rPr lang="en-US" dirty="0" err="1" smtClean="0"/>
-              <a:t>transparant</a:t>
+              <a:t>fully automatic and transparent</a:t>
             </a:r>
             <a:endParaRPr lang="en-US" dirty="0" smtClean="0"/>
           </a:p>
@@ -4134,6 +4132,19 @@
             <a:r>
               <a:rPr lang="en-US" dirty="0" smtClean="0"/>
               <a:t>e information</a:t>
+            </a:r>
+          </a:p>
+          <a:p>
+            <a:r>
+              <a:rPr lang="en-US" dirty="0" smtClean="0"/>
+              <a:t>Can generate code for GPGPUs</a:t>
+            </a:r>
+          </a:p>
+          <a:p>
+            <a:pPr lvl="1"/>
+            <a:r>
+              <a:rPr lang="en-US" dirty="0" smtClean="0"/>
+              <a:t>but you'd have to know some CUDA</a:t>
             </a:r>
             <a:endParaRPr lang="en-US" dirty="0" smtClean="0"/>
           </a:p>
@@ -4191,7 +4202,7 @@
         </p:nvSpPr>
         <p:spPr>
           <a:xfrm>
-            <a:off x="2590800" y="4060177"/>
+            <a:off x="2467562" y="4341531"/>
             <a:ext cx="3990388" cy="584775"/>
           </a:xfrm>
           <a:prstGeom prst="rect">
@@ -4411,15 +4422,95 @@
                                   </p:childTnLst>
                                 </p:cTn>
                               </p:par>
+                            </p:childTnLst>
+                          </p:cTn>
+                        </p:par>
+                      </p:childTnLst>
+                    </p:cTn>
+                  </p:par>
+                  <p:par>
+                    <p:cTn id="17" fill="hold">
+                      <p:stCondLst>
+                        <p:cond delay="indefinite"/>
+                      </p:stCondLst>
+                      <p:childTnLst>
+                        <p:par>
+                          <p:cTn id="18" fill="hold">
+                            <p:stCondLst>
+                              <p:cond delay="0"/>
+                            </p:stCondLst>
+                            <p:childTnLst>
                               <p:par>
-                                <p:cTn id="17" presetID="1" presetClass="entr" presetSubtype="0" fill="hold" grpId="0" nodeType="withEffect">
+                                <p:cTn id="19" presetID="1" presetClass="entr" presetSubtype="0" fill="hold" grpId="0" nodeType="clickEffect">
                                   <p:stCondLst>
                                     <p:cond delay="0"/>
                                   </p:stCondLst>
                                   <p:childTnLst>
                                     <p:set>
                                       <p:cBhvr>
-                                        <p:cTn id="18" dur="1" fill="hold">
+                                        <p:cTn id="20" dur="1" fill="hold">
+                                          <p:stCondLst>
+                                            <p:cond delay="0"/>
+                                          </p:stCondLst>
+                                        </p:cTn>
+                                        <p:tgtEl>
+                                          <p:spTgt spid="3">
+                                            <p:txEl>
+                                              <p:pRg st="4" end="4"/>
+                                            </p:txEl>
+                                          </p:spTgt>
+                                        </p:tgtEl>
+                                        <p:attrNameLst>
+                                          <p:attrName>style.visibility</p:attrName>
+                                        </p:attrNameLst>
+                                      </p:cBhvr>
+                                      <p:to>
+                                        <p:strVal val="visible"/>
+                                      </p:to>
+                                    </p:set>
+                                  </p:childTnLst>
+                                </p:cTn>
+                              </p:par>
+                              <p:par>
+                                <p:cTn id="21" presetID="1" presetClass="entr" presetSubtype="0" fill="hold" grpId="0" nodeType="withEffect">
+                                  <p:stCondLst>
+                                    <p:cond delay="0"/>
+                                  </p:stCondLst>
+                                  <p:childTnLst>
+                                    <p:set>
+                                      <p:cBhvr>
+                                        <p:cTn id="22" dur="1" fill="hold">
+                                          <p:stCondLst>
+                                            <p:cond delay="0"/>
+                                          </p:stCondLst>
+                                        </p:cTn>
+                                        <p:tgtEl>
+                                          <p:spTgt spid="3">
+                                            <p:txEl>
+                                              <p:pRg st="5" end="5"/>
+                                            </p:txEl>
+                                          </p:spTgt>
+                                        </p:tgtEl>
+                                        <p:attrNameLst>
+                                          <p:attrName>style.visibility</p:attrName>
+                                        </p:attrNameLst>
+                                      </p:cBhvr>
+                                      <p:to>
+                                        <p:strVal val="visible"/>
+                                      </p:to>
+                                    </p:set>
+                                  </p:childTnLst>
+                                </p:cTn>
+                              </p:par>
+                              <p:par>
+                                <p:cTn id="23" presetID="1" presetClass="entr" presetSubtype="0" fill="hold" grpId="0" nodeType="withEffect">
+                                  <p:stCondLst>
+                                    <p:cond delay="0"/>
+                                  </p:stCondLst>
+                                  <p:childTnLst>
+                                    <p:set>
+                                      <p:cBhvr>
+                                        <p:cTn id="24" dur="1" fill="hold">
                                           <p:stCondLst>
                                             <p:cond delay="0"/>
                                           </p:stCondLst>
@@ -4445,26 +4536,26 @@
                     </p:cTn>
                   </p:par>
                   <p:par>
-                    <p:cTn id="19" fill="hold">
+                    <p:cTn id="25" fill="hold">
                       <p:stCondLst>
                         <p:cond delay="indefinite"/>
                       </p:stCondLst>
                       <p:childTnLst>
                         <p:par>
-                          <p:cTn id="20" fill="hold">
+                          <p:cTn id="26" fill="hold">
                             <p:stCondLst>
                               <p:cond delay="0"/>
                             </p:stCondLst>
                             <p:childTnLst>
                               <p:par>
-                                <p:cTn id="21" presetID="1" presetClass="entr" presetSubtype="0" fill="hold" grpId="0" nodeType="clickEffect">
+                                <p:cTn id="27" presetID="1" presetClass="entr" presetSubtype="0" fill="hold" grpId="0" nodeType="clickEffect">
                                   <p:stCondLst>
                                     <p:cond delay="0"/>
                                   </p:stCondLst>
                                   <p:childTnLst>
                                     <p:set>
                                       <p:cBhvr>
-                                        <p:cTn id="22" dur="1" fill="hold">
+                                        <p:cTn id="28" dur="1" fill="hold">
                                           <p:stCondLst>
                                             <p:cond delay="0"/>
                                           </p:stCondLst>
@@ -4472,7 +4563,7 @@
                                         <p:tgtEl>
                                           <p:spTgt spid="3">
                                             <p:txEl>
-                                              <p:pRg st="6" end="6"/>
+                                              <p:pRg st="8" end="8"/>
                                             </p:txEl>
                                           </p:spTgt>
                                         </p:tgtEl>

</xml_diff>

<commit_message>
Add code and performance results for motivating example
</commit_message>
<xml_diff>
--- a/Python/python_hpc_numba.pptx
+++ b/Python/python_hpc_numba.pptx
@@ -4686,7 +4686,7 @@
         <p:spPr>
           <a:xfrm>
             <a:off x="533400" y="1676400"/>
-            <a:ext cx="5561138" cy="2862322"/>
+            <a:ext cx="6112571" cy="3139321"/>
           </a:xfrm>
           <a:prstGeom prst="rect">
             <a:avLst/>
@@ -4825,7 +4825,7 @@
                 <a:latin typeface="Courier New" panose="02070309020205020404" pitchFamily="49" charset="0"/>
                 <a:cs typeface="Courier New" panose="02070309020205020404" pitchFamily="49" charset="0"/>
               </a:rPr>
-              <a:t>primes_n.primes(1000</a:t>
+              <a:t>primes_numba.primes(1000</a:t>
             </a:r>
             <a:r>
               <a:rPr lang="nl-BE" b="1" dirty="0">
@@ -4840,35 +4840,54 @@
           </a:p>
           <a:p>
             <a:r>
-              <a:rPr lang="nl-BE" b="1" dirty="0">
+              <a:rPr lang="en-US" b="1" dirty="0" smtClean="0">
+                <a:solidFill>
+                  <a:srgbClr val="FF0000"/>
+                </a:solidFill>
+                <a:latin typeface="Courier New" panose="02070309020205020404" pitchFamily="49" charset="0"/>
+                <a:cs typeface="Courier New" panose="02070309020205020404" pitchFamily="49" charset="0"/>
+              </a:rPr>
+              <a:t>5.56 </a:t>
+            </a:r>
+            <a:r>
+              <a:rPr lang="en-US" b="1" dirty="0" err="1" smtClean="0">
+                <a:solidFill>
+                  <a:srgbClr val="FF0000"/>
+                </a:solidFill>
+                <a:latin typeface="Courier New" panose="02070309020205020404" pitchFamily="49" charset="0"/>
+                <a:cs typeface="Courier New" panose="02070309020205020404" pitchFamily="49" charset="0"/>
+              </a:rPr>
+              <a:t>ms</a:t>
+            </a:r>
+            <a:r>
+              <a:rPr lang="en-US" b="1" dirty="0" smtClean="0">
                 <a:solidFill>
                   <a:schemeClr val="bg1"/>
                 </a:solidFill>
                 <a:latin typeface="Courier New" panose="02070309020205020404" pitchFamily="49" charset="0"/>
                 <a:cs typeface="Courier New" panose="02070309020205020404" pitchFamily="49" charset="0"/>
               </a:rPr>
-              <a:t>100 loops, best of 3: </a:t>
-            </a:r>
-            <a:r>
-              <a:rPr lang="nl-BE" b="1" dirty="0">
-                <a:solidFill>
-                  <a:srgbClr val="FF0000"/>
-                </a:solidFill>
-                <a:latin typeface="Courier New" panose="02070309020205020404" pitchFamily="49" charset="0"/>
-                <a:cs typeface="Courier New" panose="02070309020205020404" pitchFamily="49" charset="0"/>
-              </a:rPr>
-              <a:t>4.89 ms</a:t>
-            </a:r>
-            <a:r>
-              <a:rPr lang="nl-BE" b="1" dirty="0">
+              <a:t> ± 226 µs per loop (mean ± std. dev.</a:t>
+            </a:r>
+          </a:p>
+          <a:p>
+            <a:r>
+              <a:rPr lang="en-US" b="1" dirty="0" smtClean="0">
                 <a:solidFill>
                   <a:schemeClr val="bg1"/>
                 </a:solidFill>
                 <a:latin typeface="Courier New" panose="02070309020205020404" pitchFamily="49" charset="0"/>
                 <a:cs typeface="Courier New" panose="02070309020205020404" pitchFamily="49" charset="0"/>
               </a:rPr>
-              <a:t> per loop</a:t>
-            </a:r>
+              <a:t>    of 7 runs, 1 loop each)</a:t>
+            </a:r>
+            <a:endParaRPr lang="nl-BE" b="1" dirty="0" smtClean="0">
+              <a:solidFill>
+                <a:schemeClr val="bg1"/>
+              </a:solidFill>
+              <a:latin typeface="Courier New" panose="02070309020205020404" pitchFamily="49" charset="0"/>
+              <a:cs typeface="Courier New" panose="02070309020205020404" pitchFamily="49" charset="0"/>
+            </a:endParaRPr>
           </a:p>
           <a:p>
             <a:endParaRPr lang="nl-BE" b="1" dirty="0">
@@ -4898,37 +4917,7 @@
                 <a:latin typeface="Courier New" panose="02070309020205020404" pitchFamily="49" charset="0"/>
                 <a:cs typeface="Courier New" panose="02070309020205020404" pitchFamily="49" charset="0"/>
               </a:rPr>
-              <a:t> %</a:t>
-            </a:r>
-            <a:r>
-              <a:rPr lang="nl-BE" b="1" dirty="0" err="1">
-                <a:solidFill>
-                  <a:schemeClr val="bg1"/>
-                </a:solidFill>
-                <a:latin typeface="Courier New" panose="02070309020205020404" pitchFamily="49" charset="0"/>
-                <a:cs typeface="Courier New" panose="02070309020205020404" pitchFamily="49" charset="0"/>
-              </a:rPr>
-              <a:t>timeit</a:t>
-            </a:r>
-            <a:r>
-              <a:rPr lang="nl-BE" b="1" dirty="0">
-                <a:solidFill>
-                  <a:schemeClr val="bg1"/>
-                </a:solidFill>
-                <a:latin typeface="Courier New" panose="02070309020205020404" pitchFamily="49" charset="0"/>
-                <a:cs typeface="Courier New" panose="02070309020205020404" pitchFamily="49" charset="0"/>
-              </a:rPr>
-              <a:t> </a:t>
-            </a:r>
-            <a:r>
-              <a:rPr lang="nl-BE" b="1" dirty="0" err="1" smtClean="0">
-                <a:solidFill>
-                  <a:schemeClr val="bg1"/>
-                </a:solidFill>
-                <a:latin typeface="Courier New" panose="02070309020205020404" pitchFamily="49" charset="0"/>
-                <a:cs typeface="Courier New" panose="02070309020205020404" pitchFamily="49" charset="0"/>
-              </a:rPr>
-              <a:t>primes_p.primes</a:t>
+              <a:t> %timeit </a:t>
             </a:r>
             <a:r>
               <a:rPr lang="nl-BE" b="1" dirty="0" smtClean="0">
@@ -4938,7 +4927,7 @@
                 <a:latin typeface="Courier New" panose="02070309020205020404" pitchFamily="49" charset="0"/>
                 <a:cs typeface="Courier New" panose="02070309020205020404" pitchFamily="49" charset="0"/>
               </a:rPr>
-              <a:t>(1000</a:t>
+              <a:t>primes_python.primes(1000</a:t>
             </a:r>
             <a:r>
               <a:rPr lang="nl-BE" b="1" dirty="0">
@@ -4953,44 +4942,87 @@
           </a:p>
           <a:p>
             <a:r>
-              <a:rPr lang="nl-BE" b="1" dirty="0">
+              <a:rPr lang="en-US" b="1" dirty="0" smtClean="0">
+                <a:solidFill>
+                  <a:srgbClr val="FF0000"/>
+                </a:solidFill>
+                <a:latin typeface="Courier New" panose="02070309020205020404" pitchFamily="49" charset="0"/>
+                <a:cs typeface="Courier New" panose="02070309020205020404" pitchFamily="49" charset="0"/>
+              </a:rPr>
+              <a:t>301 </a:t>
+            </a:r>
+            <a:r>
+              <a:rPr lang="en-US" b="1" dirty="0" err="1" smtClean="0">
+                <a:solidFill>
+                  <a:srgbClr val="FF0000"/>
+                </a:solidFill>
+                <a:latin typeface="Courier New" panose="02070309020205020404" pitchFamily="49" charset="0"/>
+                <a:cs typeface="Courier New" panose="02070309020205020404" pitchFamily="49" charset="0"/>
+              </a:rPr>
+              <a:t>ms</a:t>
+            </a:r>
+            <a:r>
+              <a:rPr lang="en-US" b="1" dirty="0" smtClean="0">
                 <a:solidFill>
                   <a:schemeClr val="bg1"/>
                 </a:solidFill>
                 <a:latin typeface="Courier New" panose="02070309020205020404" pitchFamily="49" charset="0"/>
                 <a:cs typeface="Courier New" panose="02070309020205020404" pitchFamily="49" charset="0"/>
               </a:rPr>
-              <a:t>1 loops, best of 3: </a:t>
-            </a:r>
-            <a:r>
-              <a:rPr lang="nl-BE" b="1" dirty="0">
-                <a:solidFill>
-                  <a:srgbClr val="FF0000"/>
-                </a:solidFill>
-                <a:latin typeface="Courier New" panose="02070309020205020404" pitchFamily="49" charset="0"/>
-                <a:cs typeface="Courier New" panose="02070309020205020404" pitchFamily="49" charset="0"/>
-              </a:rPr>
-              <a:t>356 ms</a:t>
-            </a:r>
-            <a:r>
-              <a:rPr lang="nl-BE" b="1" dirty="0">
+              <a:t> ± 3.25 </a:t>
+            </a:r>
+            <a:r>
+              <a:rPr lang="en-US" b="1" dirty="0" err="1" smtClean="0">
                 <a:solidFill>
                   <a:schemeClr val="bg1"/>
                 </a:solidFill>
                 <a:latin typeface="Courier New" panose="02070309020205020404" pitchFamily="49" charset="0"/>
                 <a:cs typeface="Courier New" panose="02070309020205020404" pitchFamily="49" charset="0"/>
               </a:rPr>
-              <a:t> per loop</a:t>
-            </a:r>
-          </a:p>
-          <a:p>
-            <a:endParaRPr lang="nl-BE" b="1" dirty="0">
-              <a:solidFill>
-                <a:schemeClr val="bg1"/>
-              </a:solidFill>
-              <a:latin typeface="Courier New" panose="02070309020205020404" pitchFamily="49" charset="0"/>
-              <a:cs typeface="Courier New" panose="02070309020205020404" pitchFamily="49" charset="0"/>
-            </a:endParaRPr>
+              <a:t>ms</a:t>
+            </a:r>
+            <a:r>
+              <a:rPr lang="en-US" b="1" dirty="0" smtClean="0">
+                <a:solidFill>
+                  <a:schemeClr val="bg1"/>
+                </a:solidFill>
+                <a:latin typeface="Courier New" panose="02070309020205020404" pitchFamily="49" charset="0"/>
+                <a:cs typeface="Courier New" panose="02070309020205020404" pitchFamily="49" charset="0"/>
+              </a:rPr>
+              <a:t> per loop (mean ± std. dev.</a:t>
+            </a:r>
+          </a:p>
+          <a:p>
+            <a:r>
+              <a:rPr lang="en-US" b="1" dirty="0">
+                <a:solidFill>
+                  <a:schemeClr val="bg1"/>
+                </a:solidFill>
+                <a:latin typeface="Courier New" panose="02070309020205020404" pitchFamily="49" charset="0"/>
+                <a:cs typeface="Courier New" panose="02070309020205020404" pitchFamily="49" charset="0"/>
+              </a:rPr>
+              <a:t> </a:t>
+            </a:r>
+            <a:r>
+              <a:rPr lang="en-US" b="1" dirty="0" smtClean="0">
+                <a:solidFill>
+                  <a:schemeClr val="bg1"/>
+                </a:solidFill>
+                <a:latin typeface="Courier New" panose="02070309020205020404" pitchFamily="49" charset="0"/>
+                <a:cs typeface="Courier New" panose="02070309020205020404" pitchFamily="49" charset="0"/>
+              </a:rPr>
+              <a:t>   </a:t>
+            </a:r>
+            <a:r>
+              <a:rPr lang="en-US" b="1" dirty="0" smtClean="0">
+                <a:solidFill>
+                  <a:schemeClr val="bg1"/>
+                </a:solidFill>
+                <a:latin typeface="Courier New" panose="02070309020205020404" pitchFamily="49" charset="0"/>
+                <a:cs typeface="Courier New" panose="02070309020205020404" pitchFamily="49" charset="0"/>
+              </a:rPr>
+              <a:t>of 7 runs, 1 loop each)</a:t>
+            </a:r>
           </a:p>
         </p:txBody>
       </p:sp>
@@ -5088,7 +5120,7 @@
                     <a:srgbClr val="C00000"/>
                   </a:solidFill>
                 </a:rPr>
-                <a:t>72 </a:t>
+                <a:t>54 </a:t>
               </a:r>
               <a:r>
                 <a:rPr lang="en-US" sz="2000" b="1" dirty="0" smtClean="0">
@@ -5124,7 +5156,7 @@
         </p:nvSpPr>
         <p:spPr>
           <a:xfrm>
-            <a:off x="1981200" y="4800600"/>
+            <a:off x="1565669" y="4969253"/>
             <a:ext cx="5080302" cy="1569660"/>
           </a:xfrm>
           <a:prstGeom prst="rect">
@@ -5387,10 +5419,10 @@
         </p:nvGrpSpPr>
         <p:grpSpPr>
           <a:xfrm>
-            <a:off x="4799136" y="1371600"/>
-            <a:ext cx="3887603" cy="5020574"/>
+            <a:off x="4799136" y="1301265"/>
+            <a:ext cx="3887603" cy="5509200"/>
             <a:chOff x="304800" y="1371600"/>
-            <a:chExt cx="3887603" cy="5020574"/>
+            <a:chExt cx="3887603" cy="5509200"/>
           </a:xfrm>
           <a:solidFill>
             <a:schemeClr val="bg1">
@@ -5407,7 +5439,7 @@
           <p:spPr>
             <a:xfrm>
               <a:off x="304800" y="1371600"/>
-              <a:ext cx="3887603" cy="5016758"/>
+              <a:ext cx="3887603" cy="5509200"/>
             </a:xfrm>
             <a:prstGeom prst="rect">
               <a:avLst/>
@@ -5426,347 +5458,26 @@
             <a:lstStyle/>
             <a:p>
               <a:r>
-                <a:rPr lang="nl-BE" sz="1600" dirty="0" err="1">
-                  <a:latin typeface="Courier New" panose="02070309020205020404" pitchFamily="49" charset="0"/>
-                  <a:cs typeface="Courier New" panose="02070309020205020404" pitchFamily="49" charset="0"/>
-                </a:rPr>
-                <a:t>def</a:t>
-              </a:r>
-              <a:r>
-                <a:rPr lang="nl-BE" sz="1600" dirty="0">
-                  <a:latin typeface="Courier New" panose="02070309020205020404" pitchFamily="49" charset="0"/>
-                  <a:cs typeface="Courier New" panose="02070309020205020404" pitchFamily="49" charset="0"/>
-                </a:rPr>
-                <a:t> primes(</a:t>
-              </a:r>
-              <a:r>
-                <a:rPr lang="nl-BE" sz="1600" b="1" dirty="0">
+                <a:rPr lang="nl-BE" sz="1600" dirty="0" smtClean="0">
+                  <a:latin typeface="Courier New" panose="02070309020205020404" pitchFamily="49" charset="0"/>
+                  <a:cs typeface="Courier New" panose="02070309020205020404" pitchFamily="49" charset="0"/>
+                </a:rPr>
+                <a:t>import numpy as np</a:t>
+              </a:r>
+            </a:p>
+            <a:p>
+              <a:r>
+                <a:rPr lang="nl-BE" sz="1600" b="1" dirty="0" smtClean="0">
                   <a:solidFill>
                     <a:srgbClr val="C00000"/>
                   </a:solidFill>
                   <a:latin typeface="Courier New" panose="02070309020205020404" pitchFamily="49" charset="0"/>
                   <a:cs typeface="Courier New" panose="02070309020205020404" pitchFamily="49" charset="0"/>
                 </a:rPr>
-                <a:t>int</a:t>
-              </a:r>
-              <a:r>
-                <a:rPr lang="nl-BE" sz="1600" dirty="0">
-                  <a:latin typeface="Courier New" panose="02070309020205020404" pitchFamily="49" charset="0"/>
-                  <a:cs typeface="Courier New" panose="02070309020205020404" pitchFamily="49" charset="0"/>
-                </a:rPr>
-                <a:t> </a:t>
-              </a:r>
-              <a:r>
-                <a:rPr lang="nl-BE" sz="1600" dirty="0" err="1">
-                  <a:latin typeface="Courier New" panose="02070309020205020404" pitchFamily="49" charset="0"/>
-                  <a:cs typeface="Courier New" panose="02070309020205020404" pitchFamily="49" charset="0"/>
-                </a:rPr>
-                <a:t>kmax</a:t>
-              </a:r>
-              <a:r>
-                <a:rPr lang="nl-BE" sz="1600" dirty="0">
-                  <a:latin typeface="Courier New" panose="02070309020205020404" pitchFamily="49" charset="0"/>
-                  <a:cs typeface="Courier New" panose="02070309020205020404" pitchFamily="49" charset="0"/>
-                </a:rPr>
-                <a:t>):</a:t>
+                <a:t>from numba import jit</a:t>
               </a:r>
             </a:p>
             <a:p>
-              <a:r>
-                <a:rPr lang="nl-BE" sz="1600" dirty="0">
-                  <a:latin typeface="Courier New" panose="02070309020205020404" pitchFamily="49" charset="0"/>
-                  <a:cs typeface="Courier New" panose="02070309020205020404" pitchFamily="49" charset="0"/>
-                </a:rPr>
-                <a:t>    </a:t>
-              </a:r>
-              <a:r>
-                <a:rPr lang="nl-BE" sz="1600" b="1" dirty="0" err="1">
-                  <a:solidFill>
-                    <a:srgbClr val="C00000"/>
-                  </a:solidFill>
-                  <a:latin typeface="Courier New" panose="02070309020205020404" pitchFamily="49" charset="0"/>
-                  <a:cs typeface="Courier New" panose="02070309020205020404" pitchFamily="49" charset="0"/>
-                </a:rPr>
-                <a:t>cdef</a:t>
-              </a:r>
-              <a:r>
-                <a:rPr lang="nl-BE" sz="1600" b="1" dirty="0">
-                  <a:solidFill>
-                    <a:srgbClr val="C00000"/>
-                  </a:solidFill>
-                  <a:latin typeface="Courier New" panose="02070309020205020404" pitchFamily="49" charset="0"/>
-                  <a:cs typeface="Courier New" panose="02070309020205020404" pitchFamily="49" charset="0"/>
-                </a:rPr>
-                <a:t> int</a:t>
-              </a:r>
-              <a:r>
-                <a:rPr lang="nl-BE" sz="1600" dirty="0">
-                  <a:latin typeface="Courier New" panose="02070309020205020404" pitchFamily="49" charset="0"/>
-                  <a:cs typeface="Courier New" panose="02070309020205020404" pitchFamily="49" charset="0"/>
-                </a:rPr>
-                <a:t> n, k, i</a:t>
-              </a:r>
-            </a:p>
-            <a:p>
-              <a:r>
-                <a:rPr lang="nl-BE" sz="1600" dirty="0">
-                  <a:latin typeface="Courier New" panose="02070309020205020404" pitchFamily="49" charset="0"/>
-                  <a:cs typeface="Courier New" panose="02070309020205020404" pitchFamily="49" charset="0"/>
-                </a:rPr>
-                <a:t>    </a:t>
-              </a:r>
-              <a:r>
-                <a:rPr lang="nl-BE" sz="1600" b="1" dirty="0" err="1">
-                  <a:solidFill>
-                    <a:srgbClr val="C00000"/>
-                  </a:solidFill>
-                  <a:latin typeface="Courier New" panose="02070309020205020404" pitchFamily="49" charset="0"/>
-                  <a:cs typeface="Courier New" panose="02070309020205020404" pitchFamily="49" charset="0"/>
-                </a:rPr>
-                <a:t>cdef</a:t>
-              </a:r>
-              <a:r>
-                <a:rPr lang="nl-BE" sz="1600" b="1" dirty="0">
-                  <a:solidFill>
-                    <a:srgbClr val="C00000"/>
-                  </a:solidFill>
-                  <a:latin typeface="Courier New" panose="02070309020205020404" pitchFamily="49" charset="0"/>
-                  <a:cs typeface="Courier New" panose="02070309020205020404" pitchFamily="49" charset="0"/>
-                </a:rPr>
-                <a:t> int</a:t>
-              </a:r>
-              <a:r>
-                <a:rPr lang="nl-BE" sz="1600" dirty="0">
-                  <a:latin typeface="Courier New" panose="02070309020205020404" pitchFamily="49" charset="0"/>
-                  <a:cs typeface="Courier New" panose="02070309020205020404" pitchFamily="49" charset="0"/>
-                </a:rPr>
-                <a:t> p[1000]</a:t>
-              </a:r>
-            </a:p>
-            <a:p>
-              <a:r>
-                <a:rPr lang="nl-BE" sz="1600" dirty="0">
-                  <a:latin typeface="Courier New" panose="02070309020205020404" pitchFamily="49" charset="0"/>
-                  <a:cs typeface="Courier New" panose="02070309020205020404" pitchFamily="49" charset="0"/>
-                </a:rPr>
-                <a:t>    </a:t>
-              </a:r>
-              <a:r>
-                <a:rPr lang="nl-BE" sz="1600" dirty="0" err="1">
-                  <a:latin typeface="Courier New" panose="02070309020205020404" pitchFamily="49" charset="0"/>
-                  <a:cs typeface="Courier New" panose="02070309020205020404" pitchFamily="49" charset="0"/>
-                </a:rPr>
-                <a:t>result</a:t>
-              </a:r>
-              <a:r>
-                <a:rPr lang="nl-BE" sz="1600" dirty="0">
-                  <a:latin typeface="Courier New" panose="02070309020205020404" pitchFamily="49" charset="0"/>
-                  <a:cs typeface="Courier New" panose="02070309020205020404" pitchFamily="49" charset="0"/>
-                </a:rPr>
-                <a:t> = []</a:t>
-              </a:r>
-            </a:p>
-            <a:p>
-              <a:r>
-                <a:rPr lang="nl-BE" sz="1600" dirty="0">
-                  <a:latin typeface="Courier New" panose="02070309020205020404" pitchFamily="49" charset="0"/>
-                  <a:cs typeface="Courier New" panose="02070309020205020404" pitchFamily="49" charset="0"/>
-                </a:rPr>
-                <a:t>    </a:t>
-              </a:r>
-              <a:r>
-                <a:rPr lang="nl-BE" sz="1600" dirty="0" err="1">
-                  <a:latin typeface="Courier New" panose="02070309020205020404" pitchFamily="49" charset="0"/>
-                  <a:cs typeface="Courier New" panose="02070309020205020404" pitchFamily="49" charset="0"/>
-                </a:rPr>
-                <a:t>if</a:t>
-              </a:r>
-              <a:r>
-                <a:rPr lang="nl-BE" sz="1600" dirty="0">
-                  <a:latin typeface="Courier New" panose="02070309020205020404" pitchFamily="49" charset="0"/>
-                  <a:cs typeface="Courier New" panose="02070309020205020404" pitchFamily="49" charset="0"/>
-                </a:rPr>
-                <a:t> </a:t>
-              </a:r>
-              <a:r>
-                <a:rPr lang="nl-BE" sz="1600" dirty="0" err="1">
-                  <a:latin typeface="Courier New" panose="02070309020205020404" pitchFamily="49" charset="0"/>
-                  <a:cs typeface="Courier New" panose="02070309020205020404" pitchFamily="49" charset="0"/>
-                </a:rPr>
-                <a:t>kmax</a:t>
-              </a:r>
-              <a:r>
-                <a:rPr lang="nl-BE" sz="1600" dirty="0">
-                  <a:latin typeface="Courier New" panose="02070309020205020404" pitchFamily="49" charset="0"/>
-                  <a:cs typeface="Courier New" panose="02070309020205020404" pitchFamily="49" charset="0"/>
-                </a:rPr>
-                <a:t> &gt; 1000:</a:t>
-              </a:r>
-            </a:p>
-            <a:p>
-              <a:r>
-                <a:rPr lang="nl-BE" sz="1600" dirty="0">
-                  <a:latin typeface="Courier New" panose="02070309020205020404" pitchFamily="49" charset="0"/>
-                  <a:cs typeface="Courier New" panose="02070309020205020404" pitchFamily="49" charset="0"/>
-                </a:rPr>
-                <a:t>        </a:t>
-              </a:r>
-              <a:r>
-                <a:rPr lang="nl-BE" sz="1600" dirty="0" err="1">
-                  <a:latin typeface="Courier New" panose="02070309020205020404" pitchFamily="49" charset="0"/>
-                  <a:cs typeface="Courier New" panose="02070309020205020404" pitchFamily="49" charset="0"/>
-                </a:rPr>
-                <a:t>kmax</a:t>
-              </a:r>
-              <a:r>
-                <a:rPr lang="nl-BE" sz="1600" dirty="0">
-                  <a:latin typeface="Courier New" panose="02070309020205020404" pitchFamily="49" charset="0"/>
-                  <a:cs typeface="Courier New" panose="02070309020205020404" pitchFamily="49" charset="0"/>
-                </a:rPr>
-                <a:t> = 1000</a:t>
-              </a:r>
-            </a:p>
-            <a:p>
-              <a:r>
-                <a:rPr lang="nl-BE" sz="1600" dirty="0">
-                  <a:latin typeface="Courier New" panose="02070309020205020404" pitchFamily="49" charset="0"/>
-                  <a:cs typeface="Courier New" panose="02070309020205020404" pitchFamily="49" charset="0"/>
-                </a:rPr>
-                <a:t>    k = 0</a:t>
-              </a:r>
-            </a:p>
-            <a:p>
-              <a:r>
-                <a:rPr lang="nl-BE" sz="1600" dirty="0">
-                  <a:latin typeface="Courier New" panose="02070309020205020404" pitchFamily="49" charset="0"/>
-                  <a:cs typeface="Courier New" panose="02070309020205020404" pitchFamily="49" charset="0"/>
-                </a:rPr>
-                <a:t>    n = 2</a:t>
-              </a:r>
-            </a:p>
-            <a:p>
-              <a:r>
-                <a:rPr lang="nl-BE" sz="1600" dirty="0">
-                  <a:latin typeface="Courier New" panose="02070309020205020404" pitchFamily="49" charset="0"/>
-                  <a:cs typeface="Courier New" panose="02070309020205020404" pitchFamily="49" charset="0"/>
-                </a:rPr>
-                <a:t>    </a:t>
-              </a:r>
-              <a:r>
-                <a:rPr lang="nl-BE" sz="1600" dirty="0" err="1">
-                  <a:latin typeface="Courier New" panose="02070309020205020404" pitchFamily="49" charset="0"/>
-                  <a:cs typeface="Courier New" panose="02070309020205020404" pitchFamily="49" charset="0"/>
-                </a:rPr>
-                <a:t>while</a:t>
-              </a:r>
-              <a:r>
-                <a:rPr lang="nl-BE" sz="1600" dirty="0">
-                  <a:latin typeface="Courier New" panose="02070309020205020404" pitchFamily="49" charset="0"/>
-                  <a:cs typeface="Courier New" panose="02070309020205020404" pitchFamily="49" charset="0"/>
-                </a:rPr>
-                <a:t> k &lt; </a:t>
-              </a:r>
-              <a:r>
-                <a:rPr lang="nl-BE" sz="1600" dirty="0" err="1">
-                  <a:latin typeface="Courier New" panose="02070309020205020404" pitchFamily="49" charset="0"/>
-                  <a:cs typeface="Courier New" panose="02070309020205020404" pitchFamily="49" charset="0"/>
-                </a:rPr>
-                <a:t>kmax</a:t>
-              </a:r>
-              <a:r>
-                <a:rPr lang="nl-BE" sz="1600" dirty="0">
-                  <a:latin typeface="Courier New" panose="02070309020205020404" pitchFamily="49" charset="0"/>
-                  <a:cs typeface="Courier New" panose="02070309020205020404" pitchFamily="49" charset="0"/>
-                </a:rPr>
-                <a:t>:</a:t>
-              </a:r>
-            </a:p>
-            <a:p>
-              <a:r>
-                <a:rPr lang="nl-BE" sz="1600" dirty="0">
-                  <a:latin typeface="Courier New" panose="02070309020205020404" pitchFamily="49" charset="0"/>
-                  <a:cs typeface="Courier New" panose="02070309020205020404" pitchFamily="49" charset="0"/>
-                </a:rPr>
-                <a:t>        i = 0</a:t>
-              </a:r>
-            </a:p>
-            <a:p>
-              <a:r>
-                <a:rPr lang="nl-BE" sz="1600" dirty="0">
-                  <a:latin typeface="Courier New" panose="02070309020205020404" pitchFamily="49" charset="0"/>
-                  <a:cs typeface="Courier New" panose="02070309020205020404" pitchFamily="49" charset="0"/>
-                </a:rPr>
-                <a:t>        </a:t>
-              </a:r>
-              <a:r>
-                <a:rPr lang="nl-BE" sz="1600" dirty="0" err="1">
-                  <a:latin typeface="Courier New" panose="02070309020205020404" pitchFamily="49" charset="0"/>
-                  <a:cs typeface="Courier New" panose="02070309020205020404" pitchFamily="49" charset="0"/>
-                </a:rPr>
-                <a:t>while</a:t>
-              </a:r>
-              <a:r>
-                <a:rPr lang="nl-BE" sz="1600" dirty="0">
-                  <a:latin typeface="Courier New" panose="02070309020205020404" pitchFamily="49" charset="0"/>
-                  <a:cs typeface="Courier New" panose="02070309020205020404" pitchFamily="49" charset="0"/>
-                </a:rPr>
-                <a:t> </a:t>
-              </a:r>
-              <a:r>
-                <a:rPr lang="nl-BE" sz="1600" dirty="0" smtClean="0">
-                  <a:latin typeface="Courier New" panose="02070309020205020404" pitchFamily="49" charset="0"/>
-                  <a:cs typeface="Courier New" panose="02070309020205020404" pitchFamily="49" charset="0"/>
-                </a:rPr>
-                <a:t>(i </a:t>
-              </a:r>
-              <a:r>
-                <a:rPr lang="nl-BE" sz="1600" dirty="0">
-                  <a:latin typeface="Courier New" panose="02070309020205020404" pitchFamily="49" charset="0"/>
-                  <a:cs typeface="Courier New" panose="02070309020205020404" pitchFamily="49" charset="0"/>
-                </a:rPr>
-                <a:t>&lt; k </a:t>
-              </a:r>
-              <a:r>
-                <a:rPr lang="nl-BE" sz="1600" dirty="0" err="1" smtClean="0">
-                  <a:latin typeface="Courier New" panose="02070309020205020404" pitchFamily="49" charset="0"/>
-                  <a:cs typeface="Courier New" panose="02070309020205020404" pitchFamily="49" charset="0"/>
-                </a:rPr>
-                <a:t>and</a:t>
-              </a:r>
-              <a:endParaRPr lang="nl-BE" sz="1600" dirty="0" smtClean="0">
-                <a:latin typeface="Courier New" panose="02070309020205020404" pitchFamily="49" charset="0"/>
-                <a:cs typeface="Courier New" panose="02070309020205020404" pitchFamily="49" charset="0"/>
-              </a:endParaRPr>
-            </a:p>
-            <a:p>
-              <a:r>
-                <a:rPr lang="nl-BE" sz="1600" dirty="0">
-                  <a:latin typeface="Courier New" panose="02070309020205020404" pitchFamily="49" charset="0"/>
-                  <a:cs typeface="Courier New" panose="02070309020205020404" pitchFamily="49" charset="0"/>
-                </a:rPr>
-                <a:t> </a:t>
-              </a:r>
-              <a:r>
-                <a:rPr lang="nl-BE" sz="1600" dirty="0" smtClean="0">
-                  <a:latin typeface="Courier New" panose="02070309020205020404" pitchFamily="49" charset="0"/>
-                  <a:cs typeface="Courier New" panose="02070309020205020404" pitchFamily="49" charset="0"/>
-                </a:rPr>
-                <a:t>              n </a:t>
-              </a:r>
-              <a:r>
-                <a:rPr lang="nl-BE" sz="1600" dirty="0">
-                  <a:latin typeface="Courier New" panose="02070309020205020404" pitchFamily="49" charset="0"/>
-                  <a:cs typeface="Courier New" panose="02070309020205020404" pitchFamily="49" charset="0"/>
-                </a:rPr>
-                <a:t>% p[i] != </a:t>
-              </a:r>
-              <a:r>
-                <a:rPr lang="nl-BE" sz="1600" dirty="0" smtClean="0">
-                  <a:latin typeface="Courier New" panose="02070309020205020404" pitchFamily="49" charset="0"/>
-                  <a:cs typeface="Courier New" panose="02070309020205020404" pitchFamily="49" charset="0"/>
-                </a:rPr>
-                <a:t>0):</a:t>
-              </a:r>
               <a:endParaRPr lang="nl-BE" sz="1600" dirty="0">
                 <a:latin typeface="Courier New" panose="02070309020205020404" pitchFamily="49" charset="0"/>
                 <a:cs typeface="Courier New" panose="02070309020205020404" pitchFamily="49" charset="0"/>
@@ -5774,107 +5485,177 @@
             </a:p>
             <a:p>
               <a:r>
-                <a:rPr lang="nl-BE" sz="1600" dirty="0">
-                  <a:latin typeface="Courier New" panose="02070309020205020404" pitchFamily="49" charset="0"/>
-                  <a:cs typeface="Courier New" panose="02070309020205020404" pitchFamily="49" charset="0"/>
-                </a:rPr>
-                <a:t>            i = i + 1</a:t>
+                <a:rPr lang="nl-BE" sz="1600" b="1" dirty="0" smtClean="0">
+                  <a:solidFill>
+                    <a:srgbClr val="C00000"/>
+                  </a:solidFill>
+                  <a:latin typeface="Courier New" panose="02070309020205020404" pitchFamily="49" charset="0"/>
+                  <a:cs typeface="Courier New" panose="02070309020205020404" pitchFamily="49" charset="0"/>
+                </a:rPr>
+                <a:t>@jit</a:t>
               </a:r>
             </a:p>
             <a:p>
               <a:r>
-                <a:rPr lang="nl-BE" sz="1600" dirty="0">
-                  <a:latin typeface="Courier New" panose="02070309020205020404" pitchFamily="49" charset="0"/>
-                  <a:cs typeface="Courier New" panose="02070309020205020404" pitchFamily="49" charset="0"/>
-                </a:rPr>
-                <a:t>        </a:t>
-              </a:r>
-              <a:r>
-                <a:rPr lang="nl-BE" sz="1600" dirty="0" err="1">
-                  <a:latin typeface="Courier New" panose="02070309020205020404" pitchFamily="49" charset="0"/>
-                  <a:cs typeface="Courier New" panose="02070309020205020404" pitchFamily="49" charset="0"/>
-                </a:rPr>
-                <a:t>if</a:t>
-              </a:r>
-              <a:r>
-                <a:rPr lang="nl-BE" sz="1600" dirty="0">
-                  <a:latin typeface="Courier New" panose="02070309020205020404" pitchFamily="49" charset="0"/>
-                  <a:cs typeface="Courier New" panose="02070309020205020404" pitchFamily="49" charset="0"/>
-                </a:rPr>
-                <a:t> i == k:</a:t>
+                <a:rPr lang="nl-BE" sz="1600" dirty="0" smtClean="0">
+                  <a:latin typeface="Courier New" panose="02070309020205020404" pitchFamily="49" charset="0"/>
+                  <a:cs typeface="Courier New" panose="02070309020205020404" pitchFamily="49" charset="0"/>
+                </a:rPr>
+                <a:t>def primes(kmax):</a:t>
               </a:r>
             </a:p>
             <a:p>
               <a:r>
-                <a:rPr lang="nl-BE" sz="1600" dirty="0">
-                  <a:latin typeface="Courier New" panose="02070309020205020404" pitchFamily="49" charset="0"/>
-                  <a:cs typeface="Courier New" panose="02070309020205020404" pitchFamily="49" charset="0"/>
-                </a:rPr>
-                <a:t>            p[k] = n</a:t>
+                <a:rPr lang="nl-BE" sz="1600" dirty="0" smtClean="0">
+                  <a:latin typeface="Courier New" panose="02070309020205020404" pitchFamily="49" charset="0"/>
+                  <a:cs typeface="Courier New" panose="02070309020205020404" pitchFamily="49" charset="0"/>
+                </a:rPr>
+                <a:t>    p = np.zeros(1000)</a:t>
               </a:r>
             </a:p>
             <a:p>
               <a:r>
-                <a:rPr lang="nl-BE" sz="1600" dirty="0">
-                  <a:latin typeface="Courier New" panose="02070309020205020404" pitchFamily="49" charset="0"/>
-                  <a:cs typeface="Courier New" panose="02070309020205020404" pitchFamily="49" charset="0"/>
-                </a:rPr>
-                <a:t>            k = k + 1</a:t>
+                <a:rPr lang="nl-BE" sz="1600" dirty="0" smtClean="0">
+                  <a:latin typeface="Courier New" panose="02070309020205020404" pitchFamily="49" charset="0"/>
+                  <a:cs typeface="Courier New" panose="02070309020205020404" pitchFamily="49" charset="0"/>
+                </a:rPr>
+                <a:t>    result = []</a:t>
               </a:r>
             </a:p>
             <a:p>
               <a:r>
-                <a:rPr lang="nl-BE" sz="1600" dirty="0">
-                  <a:latin typeface="Courier New" panose="02070309020205020404" pitchFamily="49" charset="0"/>
-                  <a:cs typeface="Courier New" panose="02070309020205020404" pitchFamily="49" charset="0"/>
-                </a:rPr>
-                <a:t>            </a:t>
-              </a:r>
-              <a:r>
-                <a:rPr lang="nl-BE" sz="1600" dirty="0" err="1">
-                  <a:latin typeface="Courier New" panose="02070309020205020404" pitchFamily="49" charset="0"/>
-                  <a:cs typeface="Courier New" panose="02070309020205020404" pitchFamily="49" charset="0"/>
-                </a:rPr>
-                <a:t>result.append</a:t>
-              </a:r>
-              <a:r>
-                <a:rPr lang="nl-BE" sz="1600" dirty="0">
-                  <a:latin typeface="Courier New" panose="02070309020205020404" pitchFamily="49" charset="0"/>
-                  <a:cs typeface="Courier New" panose="02070309020205020404" pitchFamily="49" charset="0"/>
-                </a:rPr>
-                <a:t>(n)</a:t>
+                <a:rPr lang="nl-BE" sz="1600" dirty="0" smtClean="0">
+                  <a:latin typeface="Courier New" panose="02070309020205020404" pitchFamily="49" charset="0"/>
+                  <a:cs typeface="Courier New" panose="02070309020205020404" pitchFamily="49" charset="0"/>
+                </a:rPr>
+                <a:t>    if kmax &gt; 1000:</a:t>
               </a:r>
             </a:p>
             <a:p>
               <a:r>
-                <a:rPr lang="nl-BE" sz="1600" dirty="0">
-                  <a:latin typeface="Courier New" panose="02070309020205020404" pitchFamily="49" charset="0"/>
-                  <a:cs typeface="Courier New" panose="02070309020205020404" pitchFamily="49" charset="0"/>
-                </a:rPr>
-                <a:t>        n = n + 1</a:t>
+                <a:rPr lang="nl-BE" sz="1600" dirty="0" smtClean="0">
+                  <a:latin typeface="Courier New" panose="02070309020205020404" pitchFamily="49" charset="0"/>
+                  <a:cs typeface="Courier New" panose="02070309020205020404" pitchFamily="49" charset="0"/>
+                </a:rPr>
+                <a:t>        kmax = 1000</a:t>
               </a:r>
             </a:p>
             <a:p>
               <a:r>
-                <a:rPr lang="nl-BE" sz="1600" dirty="0">
-                  <a:latin typeface="Courier New" panose="02070309020205020404" pitchFamily="49" charset="0"/>
-                  <a:cs typeface="Courier New" panose="02070309020205020404" pitchFamily="49" charset="0"/>
-                </a:rPr>
-                <a:t>    return </a:t>
-              </a:r>
-              <a:r>
-                <a:rPr lang="nl-BE" sz="1600" dirty="0" err="1" smtClean="0">
-                  <a:latin typeface="Courier New" panose="02070309020205020404" pitchFamily="49" charset="0"/>
-                  <a:cs typeface="Courier New" panose="02070309020205020404" pitchFamily="49" charset="0"/>
-                </a:rPr>
-                <a:t>result</a:t>
-              </a:r>
-              <a:endParaRPr lang="nl-BE" sz="1600" dirty="0" smtClean="0">
-                <a:latin typeface="Courier New" panose="02070309020205020404" pitchFamily="49" charset="0"/>
-                <a:cs typeface="Courier New" panose="02070309020205020404" pitchFamily="49" charset="0"/>
-              </a:endParaRPr>
+                <a:rPr lang="nl-BE" sz="1600" dirty="0" smtClean="0">
+                  <a:latin typeface="Courier New" panose="02070309020205020404" pitchFamily="49" charset="0"/>
+                  <a:cs typeface="Courier New" panose="02070309020205020404" pitchFamily="49" charset="0"/>
+                </a:rPr>
+                <a:t>    k = 0</a:t>
+              </a:r>
             </a:p>
             <a:p>
+              <a:r>
+                <a:rPr lang="nl-BE" sz="1600" dirty="0" smtClean="0">
+                  <a:latin typeface="Courier New" panose="02070309020205020404" pitchFamily="49" charset="0"/>
+                  <a:cs typeface="Courier New" panose="02070309020205020404" pitchFamily="49" charset="0"/>
+                </a:rPr>
+                <a:t>    n = 2</a:t>
+              </a:r>
+            </a:p>
+            <a:p>
+              <a:r>
+                <a:rPr lang="nl-BE" sz="1600" dirty="0" smtClean="0">
+                  <a:latin typeface="Courier New" panose="02070309020205020404" pitchFamily="49" charset="0"/>
+                  <a:cs typeface="Courier New" panose="02070309020205020404" pitchFamily="49" charset="0"/>
+                </a:rPr>
+                <a:t>    while k &lt; kmax:</a:t>
+              </a:r>
+            </a:p>
+            <a:p>
+              <a:r>
+                <a:rPr lang="nl-BE" sz="1600" dirty="0" smtClean="0">
+                  <a:latin typeface="Courier New" panose="02070309020205020404" pitchFamily="49" charset="0"/>
+                  <a:cs typeface="Courier New" panose="02070309020205020404" pitchFamily="49" charset="0"/>
+                </a:rPr>
+                <a:t>        i = 0</a:t>
+              </a:r>
+            </a:p>
+            <a:p>
+              <a:r>
+                <a:rPr lang="nl-BE" sz="1600" dirty="0" smtClean="0">
+                  <a:latin typeface="Courier New" panose="02070309020205020404" pitchFamily="49" charset="0"/>
+                  <a:cs typeface="Courier New" panose="02070309020205020404" pitchFamily="49" charset="0"/>
+                </a:rPr>
+                <a:t>        while (i &lt; k and</a:t>
+              </a:r>
+            </a:p>
+            <a:p>
+              <a:r>
+                <a:rPr lang="nl-BE" sz="1600" dirty="0" smtClean="0">
+                  <a:latin typeface="Courier New" panose="02070309020205020404" pitchFamily="49" charset="0"/>
+                  <a:cs typeface="Courier New" panose="02070309020205020404" pitchFamily="49" charset="0"/>
+                </a:rPr>
+                <a:t>               n % p[i] != 0):</a:t>
+              </a:r>
+            </a:p>
+            <a:p>
+              <a:r>
+                <a:rPr lang="nl-BE" sz="1600" dirty="0" smtClean="0">
+                  <a:latin typeface="Courier New" panose="02070309020205020404" pitchFamily="49" charset="0"/>
+                  <a:cs typeface="Courier New" panose="02070309020205020404" pitchFamily="49" charset="0"/>
+                </a:rPr>
+                <a:t>            i = i + 1</a:t>
+              </a:r>
+            </a:p>
+            <a:p>
+              <a:r>
+                <a:rPr lang="nl-BE" sz="1600" dirty="0" smtClean="0">
+                  <a:latin typeface="Courier New" panose="02070309020205020404" pitchFamily="49" charset="0"/>
+                  <a:cs typeface="Courier New" panose="02070309020205020404" pitchFamily="49" charset="0"/>
+                </a:rPr>
+                <a:t>        if i == k:</a:t>
+              </a:r>
+            </a:p>
+            <a:p>
+              <a:r>
+                <a:rPr lang="nl-BE" sz="1600" dirty="0" smtClean="0">
+                  <a:latin typeface="Courier New" panose="02070309020205020404" pitchFamily="49" charset="0"/>
+                  <a:cs typeface="Courier New" panose="02070309020205020404" pitchFamily="49" charset="0"/>
+                </a:rPr>
+                <a:t>            p[k] = n</a:t>
+              </a:r>
+            </a:p>
+            <a:p>
+              <a:r>
+                <a:rPr lang="nl-BE" sz="1600" dirty="0" smtClean="0">
+                  <a:latin typeface="Courier New" panose="02070309020205020404" pitchFamily="49" charset="0"/>
+                  <a:cs typeface="Courier New" panose="02070309020205020404" pitchFamily="49" charset="0"/>
+                </a:rPr>
+                <a:t>            k = k + 1</a:t>
+              </a:r>
+            </a:p>
+            <a:p>
+              <a:r>
+                <a:rPr lang="nl-BE" sz="1600" dirty="0" smtClean="0">
+                  <a:latin typeface="Courier New" panose="02070309020205020404" pitchFamily="49" charset="0"/>
+                  <a:cs typeface="Courier New" panose="02070309020205020404" pitchFamily="49" charset="0"/>
+                </a:rPr>
+                <a:t>            result.append(n)</a:t>
+              </a:r>
+            </a:p>
+            <a:p>
+              <a:r>
+                <a:rPr lang="nl-BE" sz="1600" dirty="0" smtClean="0">
+                  <a:latin typeface="Courier New" panose="02070309020205020404" pitchFamily="49" charset="0"/>
+                  <a:cs typeface="Courier New" panose="02070309020205020404" pitchFamily="49" charset="0"/>
+                </a:rPr>
+                <a:t>        n = n + 1</a:t>
+              </a:r>
+            </a:p>
+            <a:p>
+              <a:r>
+                <a:rPr lang="nl-BE" sz="1600" dirty="0" smtClean="0">
+                  <a:latin typeface="Courier New" panose="02070309020205020404" pitchFamily="49" charset="0"/>
+                  <a:cs typeface="Courier New" panose="02070309020205020404" pitchFamily="49" charset="0"/>
+                </a:rPr>
+                <a:t>    return result</a:t>
+              </a:r>
               <a:endParaRPr lang="nl-BE" sz="1600" dirty="0">
                 <a:latin typeface="Courier New" panose="02070309020205020404" pitchFamily="49" charset="0"/>
                 <a:cs typeface="Courier New" panose="02070309020205020404" pitchFamily="49" charset="0"/>
@@ -5890,8 +5671,8 @@
           </p:nvSpPr>
           <p:spPr>
             <a:xfrm>
-              <a:off x="3040620" y="6084397"/>
-              <a:ext cx="1150380" cy="307777"/>
+              <a:off x="3101335" y="6569239"/>
+              <a:ext cx="1091068" cy="307777"/>
             </a:xfrm>
             <a:prstGeom prst="rect">
               <a:avLst/>
@@ -5912,8 +5693,8 @@
             <a:lstStyle/>
             <a:p>
               <a:r>
-                <a:rPr lang="en-US" sz="1400" dirty="0" err="1" smtClean="0"/>
-                <a:t>primes_c.pyx</a:t>
+                <a:rPr lang="en-US" sz="1400" dirty="0" smtClean="0"/>
+                <a:t>primes_n.py</a:t>
               </a:r>
               <a:endParaRPr lang="nl-BE" sz="1400" dirty="0"/>
             </a:p>
@@ -5928,7 +5709,7 @@
         </p:nvGrpSpPr>
         <p:grpSpPr>
           <a:xfrm>
-            <a:off x="466989" y="1371600"/>
+            <a:off x="457261" y="1301265"/>
             <a:ext cx="3887603" cy="5020574"/>
             <a:chOff x="4951597" y="1371600"/>
             <a:chExt cx="3887603" cy="5020574"/>
@@ -5967,25 +5748,11 @@
             <a:lstStyle/>
             <a:p>
               <a:r>
-                <a:rPr lang="nl-BE" sz="1600" dirty="0" err="1">
-                  <a:latin typeface="Courier New" panose="02070309020205020404" pitchFamily="49" charset="0"/>
-                  <a:cs typeface="Courier New" panose="02070309020205020404" pitchFamily="49" charset="0"/>
-                </a:rPr>
-                <a:t>from</a:t>
-              </a:r>
-              <a:r>
-                <a:rPr lang="nl-BE" sz="1600" dirty="0">
-                  <a:latin typeface="Courier New" panose="02070309020205020404" pitchFamily="49" charset="0"/>
-                  <a:cs typeface="Courier New" panose="02070309020205020404" pitchFamily="49" charset="0"/>
-                </a:rPr>
-                <a:t> array import </a:t>
-              </a:r>
-              <a:r>
                 <a:rPr lang="nl-BE" sz="1600" dirty="0" smtClean="0">
                   <a:latin typeface="Courier New" panose="02070309020205020404" pitchFamily="49" charset="0"/>
                   <a:cs typeface="Courier New" panose="02070309020205020404" pitchFamily="49" charset="0"/>
                 </a:rPr>
-                <a:t>array</a:t>
+                <a:t>import numpy as np</a:t>
               </a:r>
               <a:endParaRPr lang="nl-BE" sz="1600" dirty="0">
                 <a:latin typeface="Courier New" panose="02070309020205020404" pitchFamily="49" charset="0"/>
@@ -6034,8 +5801,19 @@
                   <a:latin typeface="Courier New" panose="02070309020205020404" pitchFamily="49" charset="0"/>
                   <a:cs typeface="Courier New" panose="02070309020205020404" pitchFamily="49" charset="0"/>
                 </a:rPr>
-                <a:t>    p = array('i', [0]*1000)</a:t>
-              </a:r>
+                <a:t>    p = </a:t>
+              </a:r>
+              <a:r>
+                <a:rPr lang="nl-BE" sz="1600" dirty="0" smtClean="0">
+                  <a:latin typeface="Courier New" panose="02070309020205020404" pitchFamily="49" charset="0"/>
+                  <a:cs typeface="Courier New" panose="02070309020205020404" pitchFamily="49" charset="0"/>
+                </a:rPr>
+                <a:t>np.zeros(1000)</a:t>
+              </a:r>
+              <a:endParaRPr lang="nl-BE" sz="1600" dirty="0">
+                <a:latin typeface="Courier New" panose="02070309020205020404" pitchFamily="49" charset="0"/>
+                <a:cs typeface="Courier New" panose="02070309020205020404" pitchFamily="49" charset="0"/>
+              </a:endParaRPr>
             </a:p>
             <a:p>
               <a:r>
@@ -6408,6 +6186,51 @@
           </p:txBody>
         </p:sp>
       </p:grpSp>
+      <p:sp>
+        <p:nvSpPr>
+          <p:cNvPr id="10" name="TextBox 9"/>
+          <p:cNvSpPr txBox="1"/>
+          <p:nvPr/>
+        </p:nvSpPr>
+        <p:spPr>
+          <a:xfrm>
+            <a:off x="7823092" y="1690689"/>
+            <a:ext cx="1113959" cy="707886"/>
+          </a:xfrm>
+          <a:prstGeom prst="rect">
+            <a:avLst/>
+          </a:prstGeom>
+          <a:solidFill>
+            <a:schemeClr val="bg1"/>
+          </a:solidFill>
+          <a:ln>
+            <a:solidFill>
+              <a:schemeClr val="tx1"/>
+            </a:solidFill>
+          </a:ln>
+        </p:spPr>
+        <p:txBody>
+          <a:bodyPr wrap="none" rtlCol="0">
+            <a:spAutoFit/>
+          </a:bodyPr>
+          <a:lstStyle/>
+          <a:p>
+            <a:pPr algn="ctr"/>
+            <a:r>
+              <a:rPr lang="en-US" sz="2000" dirty="0" smtClean="0"/>
+              <a:t>That was</a:t>
+            </a:r>
+            <a:br>
+              <a:rPr lang="en-US" sz="2000" dirty="0" smtClean="0"/>
+            </a:br>
+            <a:r>
+              <a:rPr lang="en-US" sz="2000" i="1" dirty="0" smtClean="0"/>
+              <a:t>trivial!</a:t>
+            </a:r>
+            <a:endParaRPr lang="en-US" sz="2000" i="1" dirty="0"/>
+          </a:p>
+        </p:txBody>
+      </p:sp>
     </p:spTree>
     <p:extLst>
       <p:ext uri="{BB962C8B-B14F-4D97-AF65-F5344CB8AC3E}">
@@ -6471,6 +6294,51 @@
                       </p:childTnLst>
                     </p:cTn>
                   </p:par>
+                  <p:par>
+                    <p:cTn id="7" fill="hold">
+                      <p:stCondLst>
+                        <p:cond delay="indefinite"/>
+                      </p:stCondLst>
+                      <p:childTnLst>
+                        <p:par>
+                          <p:cTn id="8" fill="hold">
+                            <p:stCondLst>
+                              <p:cond delay="0"/>
+                            </p:stCondLst>
+                            <p:childTnLst>
+                              <p:par>
+                                <p:cTn id="9" presetID="1" presetClass="entr" presetSubtype="0" fill="hold" grpId="0" nodeType="clickEffect">
+                                  <p:stCondLst>
+                                    <p:cond delay="0"/>
+                                  </p:stCondLst>
+                                  <p:childTnLst>
+                                    <p:set>
+                                      <p:cBhvr>
+                                        <p:cTn id="10" dur="1" fill="hold">
+                                          <p:stCondLst>
+                                            <p:cond delay="0"/>
+                                          </p:stCondLst>
+                                        </p:cTn>
+                                        <p:tgtEl>
+                                          <p:spTgt spid="10"/>
+                                        </p:tgtEl>
+                                        <p:attrNameLst>
+                                          <p:attrName>style.visibility</p:attrName>
+                                        </p:attrNameLst>
+                                      </p:cBhvr>
+                                      <p:to>
+                                        <p:strVal val="visible"/>
+                                      </p:to>
+                                    </p:set>
+                                  </p:childTnLst>
+                                </p:cTn>
+                              </p:par>
+                            </p:childTnLst>
+                          </p:cTn>
+                        </p:par>
+                      </p:childTnLst>
+                    </p:cTn>
+                  </p:par>
                 </p:childTnLst>
               </p:cTn>
               <p:prevCondLst>
@@ -6492,6 +6360,9 @@
         </p:cTn>
       </p:par>
     </p:tnLst>
+    <p:bldLst>
+      <p:bldP spid="10" grpId="0" animBg="1"/>
+    </p:bldLst>
   </p:timing>
 </p:sld>
 </file>

</xml_diff>

<commit_message>
Add timings for Python array prime implementation
</commit_message>
<xml_diff>
--- a/Python/python_hpc_numba.pptx
+++ b/Python/python_hpc_numba.pptx
@@ -6,11 +6,12 @@
   </p:sldMasterIdLst>
   <p:sldIdLst>
     <p:sldId id="257" r:id="rId2"/>
-    <p:sldId id="258" r:id="rId3"/>
-    <p:sldId id="259" r:id="rId4"/>
-    <p:sldId id="260" r:id="rId5"/>
-    <p:sldId id="261" r:id="rId6"/>
-    <p:sldId id="262" r:id="rId7"/>
+    <p:sldId id="259" r:id="rId3"/>
+    <p:sldId id="260" r:id="rId4"/>
+    <p:sldId id="261" r:id="rId5"/>
+    <p:sldId id="262" r:id="rId6"/>
+    <p:sldId id="263" r:id="rId7"/>
+    <p:sldId id="264" r:id="rId8"/>
   </p:sldIdLst>
   <p:sldSz cx="9144000" cy="6858000" type="screen4x3"/>
   <p:notesSz cx="6858000" cy="9144000"/>
@@ -109,6 +110,11 @@
       </a:defRPr>
     </a:lvl9pPr>
   </p:defaultTextStyle>
+  <p:extLst>
+    <p:ext uri="{EFAFB233-063F-42B5-8137-9DF3F51BA10A}">
+      <p15:sldGuideLst xmlns:p15="http://schemas.microsoft.com/office/powerpoint/2012/main"/>
+    </p:ext>
+  </p:extLst>
 </p:presentation>
 </file>
 
@@ -2992,11 +2998,7 @@
             </a:r>
             <a:r>
               <a:rPr lang="en-US" dirty="0" smtClean="0"/>
-              <a:t> to </a:t>
-            </a:r>
-            <a:r>
-              <a:rPr lang="en-US" dirty="0" smtClean="0"/>
-              <a:t>speed up Python</a:t>
+              <a:t> to speed up Python</a:t>
             </a:r>
             <a:endParaRPr lang="nl-BE" dirty="0"/>
           </a:p>
@@ -3109,109 +3111,6 @@
           <a:p>
             <a:r>
               <a:rPr lang="en-US" dirty="0" smtClean="0"/>
-              <a:t>Motivating example</a:t>
-            </a:r>
-            <a:endParaRPr lang="nl-BE" dirty="0"/>
-          </a:p>
-        </p:txBody>
-      </p:sp>
-      <p:sp>
-        <p:nvSpPr>
-          <p:cNvPr id="3" name="Text Placeholder 2"/>
-          <p:cNvSpPr>
-            <a:spLocks noGrp="1"/>
-          </p:cNvSpPr>
-          <p:nvPr>
-            <p:ph type="body" idx="1"/>
-          </p:nvPr>
-        </p:nvSpPr>
-        <p:spPr/>
-        <p:txBody>
-          <a:bodyPr/>
-          <a:lstStyle/>
-          <a:p>
-            <a:endParaRPr lang="nl-BE"/>
-          </a:p>
-        </p:txBody>
-      </p:sp>
-      <p:sp>
-        <p:nvSpPr>
-          <p:cNvPr id="4" name="Slide Number Placeholder 3"/>
-          <p:cNvSpPr>
-            <a:spLocks noGrp="1"/>
-          </p:cNvSpPr>
-          <p:nvPr>
-            <p:ph type="sldNum" sz="quarter" idx="12"/>
-          </p:nvPr>
-        </p:nvSpPr>
-        <p:spPr/>
-        <p:txBody>
-          <a:bodyPr/>
-          <a:lstStyle/>
-          <a:p>
-            <a:fld id="{B6F15528-21DE-4FAA-801E-634DDDAF4B2B}" type="slidenum">
-              <a:rPr lang="en-US" smtClean="0"/>
-              <a:pPr/>
-              <a:t>2</a:t>
-            </a:fld>
-            <a:endParaRPr lang="en-US"/>
-          </a:p>
-        </p:txBody>
-      </p:sp>
-    </p:spTree>
-    <p:extLst>
-      <p:ext uri="{BB962C8B-B14F-4D97-AF65-F5344CB8AC3E}">
-        <p14:creationId xmlns:p14="http://schemas.microsoft.com/office/powerpoint/2010/main" val="461966004"/>
-      </p:ext>
-    </p:extLst>
-  </p:cSld>
-  <p:clrMapOvr>
-    <a:masterClrMapping/>
-  </p:clrMapOvr>
-  <p:timing>
-    <p:tnLst>
-      <p:par>
-        <p:cTn id="1" dur="indefinite" restart="never" nodeType="tmRoot"/>
-      </p:par>
-    </p:tnLst>
-  </p:timing>
-</p:sld>
-</file>
-
-<file path=ppt/slides/slide3.xml><?xml version="1.0" encoding="utf-8"?>
-<p:sld xmlns:a="http://schemas.openxmlformats.org/drawingml/2006/main" xmlns:r="http://schemas.openxmlformats.org/officeDocument/2006/relationships" xmlns:p="http://schemas.openxmlformats.org/presentationml/2006/main">
-  <p:cSld>
-    <p:spTree>
-      <p:nvGrpSpPr>
-        <p:cNvPr id="1" name=""/>
-        <p:cNvGrpSpPr/>
-        <p:nvPr/>
-      </p:nvGrpSpPr>
-      <p:grpSpPr>
-        <a:xfrm>
-          <a:off x="0" y="0"/>
-          <a:ext cx="0" cy="0"/>
-          <a:chOff x="0" y="0"/>
-          <a:chExt cx="0" cy="0"/>
-        </a:xfrm>
-      </p:grpSpPr>
-      <p:sp>
-        <p:nvSpPr>
-          <p:cNvPr id="2" name="Title 1"/>
-          <p:cNvSpPr>
-            <a:spLocks noGrp="1"/>
-          </p:cNvSpPr>
-          <p:nvPr>
-            <p:ph type="title"/>
-          </p:nvPr>
-        </p:nvSpPr>
-        <p:spPr/>
-        <p:txBody>
-          <a:bodyPr/>
-          <a:lstStyle/>
-          <a:p>
-            <a:r>
-              <a:rPr lang="en-US" dirty="0" smtClean="0"/>
               <a:t>Motivation</a:t>
             </a:r>
             <a:endParaRPr lang="nl-BE" dirty="0"/>
@@ -3400,7 +3299,7 @@
             <a:fld id="{B6F15528-21DE-4FAA-801E-634DDDAF4B2B}" type="slidenum">
               <a:rPr lang="en-US" smtClean="0"/>
               <a:pPr/>
-              <a:t>3</a:t>
+              <a:t>2</a:t>
             </a:fld>
             <a:endParaRPr lang="en-US"/>
           </a:p>
@@ -4043,7 +3942,7 @@
 </p:sld>
 </file>
 
-<file path=ppt/slides/slide4.xml><?xml version="1.0" encoding="utf-8"?>
+<file path=ppt/slides/slide3.xml><?xml version="1.0" encoding="utf-8"?>
 <p:sld xmlns:a="http://schemas.openxmlformats.org/drawingml/2006/main" xmlns:r="http://schemas.openxmlformats.org/officeDocument/2006/relationships" xmlns:p="http://schemas.openxmlformats.org/presentationml/2006/main">
   <p:cSld>
     <p:spTree>
@@ -4102,13 +4001,8 @@
           <a:p>
             <a:r>
               <a:rPr lang="en-US" dirty="0" smtClean="0"/>
-              <a:t>Annotate Python </a:t>
-            </a:r>
-            <a:r>
-              <a:rPr lang="en-US" dirty="0" smtClean="0"/>
-              <a:t>functions with decorators</a:t>
-            </a:r>
-            <a:endParaRPr lang="en-US" dirty="0" smtClean="0"/>
+              <a:t>Annotate Python functions with decorators</a:t>
+            </a:r>
           </a:p>
           <a:p>
             <a:r>
@@ -4122,16 +4016,11 @@
               <a:rPr lang="en-US" dirty="0" smtClean="0"/>
               <a:t>fully automatic and transparent</a:t>
             </a:r>
-            <a:endParaRPr lang="en-US" dirty="0" smtClean="0"/>
           </a:p>
           <a:p>
             <a:r>
               <a:rPr lang="en-US" dirty="0" smtClean="0"/>
-              <a:t>For better performance, provide typ</a:t>
-            </a:r>
-            <a:r>
-              <a:rPr lang="en-US" dirty="0" smtClean="0"/>
-              <a:t>e information</a:t>
+              <a:t>For better performance, provide type information</a:t>
             </a:r>
           </a:p>
           <a:p>
@@ -4146,7 +4035,6 @@
               <a:rPr lang="en-US" dirty="0" smtClean="0"/>
               <a:t>but you'd have to know some CUDA</a:t>
             </a:r>
-            <a:endParaRPr lang="en-US" dirty="0" smtClean="0"/>
           </a:p>
           <a:p>
             <a:endParaRPr lang="en-US" dirty="0"/>
@@ -4188,7 +4076,7 @@
             <a:fld id="{B6F15528-21DE-4FAA-801E-634DDDAF4B2B}" type="slidenum">
               <a:rPr lang="en-US" smtClean="0"/>
               <a:pPr/>
-              <a:t>4</a:t>
+              <a:t>3</a:t>
             </a:fld>
             <a:endParaRPr lang="en-US"/>
           </a:p>
@@ -4613,7 +4501,7 @@
 </p:sld>
 </file>
 
-<file path=ppt/slides/slide5.xml><?xml version="1.0" encoding="utf-8"?>
+<file path=ppt/slides/slide4.xml><?xml version="1.0" encoding="utf-8"?>
 <p:sld xmlns:a="http://schemas.openxmlformats.org/drawingml/2006/main" xmlns:r="http://schemas.openxmlformats.org/officeDocument/2006/relationships" xmlns:p="http://schemas.openxmlformats.org/presentationml/2006/main">
   <p:cSld>
     <p:spTree>
@@ -4671,7 +4559,7 @@
             <a:fld id="{B6F15528-21DE-4FAA-801E-634DDDAF4B2B}" type="slidenum">
               <a:rPr lang="en-US" smtClean="0"/>
               <a:pPr/>
-              <a:t>5</a:t>
+              <a:t>4</a:t>
             </a:fld>
             <a:endParaRPr lang="en-US"/>
           </a:p>
@@ -4722,14 +4610,14 @@
               <a:t> import </a:t>
             </a:r>
             <a:r>
-              <a:rPr lang="nl-BE" b="1" dirty="0" err="1">
+              <a:rPr lang="nl-BE" b="1" dirty="0" smtClean="0">
                 <a:solidFill>
                   <a:schemeClr val="bg1"/>
                 </a:solidFill>
                 <a:latin typeface="Courier New" panose="02070309020205020404" pitchFamily="49" charset="0"/>
                 <a:cs typeface="Courier New" panose="02070309020205020404" pitchFamily="49" charset="0"/>
               </a:rPr>
-              <a:t>primes_vanilla</a:t>
+              <a:t>primes_p</a:t>
             </a:r>
             <a:endParaRPr lang="nl-BE" b="1" dirty="0">
               <a:solidFill>
@@ -4777,7 +4665,7 @@
                 <a:latin typeface="Courier New" panose="02070309020205020404" pitchFamily="49" charset="0"/>
                 <a:cs typeface="Courier New" panose="02070309020205020404" pitchFamily="49" charset="0"/>
               </a:rPr>
-              <a:t>primes_numba</a:t>
+              <a:t>primes_n</a:t>
             </a:r>
             <a:endParaRPr lang="nl-BE" b="1" dirty="0">
               <a:solidFill>
@@ -4825,7 +4713,7 @@
                 <a:latin typeface="Courier New" panose="02070309020205020404" pitchFamily="49" charset="0"/>
                 <a:cs typeface="Courier New" panose="02070309020205020404" pitchFamily="49" charset="0"/>
               </a:rPr>
-              <a:t>primes_numba.primes(1000</a:t>
+              <a:t>primes_n.primes(1000</a:t>
             </a:r>
             <a:r>
               <a:rPr lang="nl-BE" b="1" dirty="0">
@@ -4927,7 +4815,7 @@
                 <a:latin typeface="Courier New" panose="02070309020205020404" pitchFamily="49" charset="0"/>
                 <a:cs typeface="Courier New" panose="02070309020205020404" pitchFamily="49" charset="0"/>
               </a:rPr>
-              <a:t>primes_python.primes(1000</a:t>
+              <a:t>primes_p.primes(1000</a:t>
             </a:r>
             <a:r>
               <a:rPr lang="nl-BE" b="1" dirty="0">
@@ -5011,17 +4899,7 @@
                 <a:latin typeface="Courier New" panose="02070309020205020404" pitchFamily="49" charset="0"/>
                 <a:cs typeface="Courier New" panose="02070309020205020404" pitchFamily="49" charset="0"/>
               </a:rPr>
-              <a:t>   </a:t>
-            </a:r>
-            <a:r>
-              <a:rPr lang="en-US" b="1" dirty="0" smtClean="0">
-                <a:solidFill>
-                  <a:schemeClr val="bg1"/>
-                </a:solidFill>
-                <a:latin typeface="Courier New" panose="02070309020205020404" pitchFamily="49" charset="0"/>
-                <a:cs typeface="Courier New" panose="02070309020205020404" pitchFamily="49" charset="0"/>
-              </a:rPr>
-              <a:t>of 7 runs, 1 loop each)</a:t>
+              <a:t>   of 7 runs, 1 loop each)</a:t>
             </a:r>
           </a:p>
         </p:txBody>
@@ -5157,7 +5035,7 @@
         <p:spPr>
           <a:xfrm>
             <a:off x="1565669" y="4969253"/>
-            <a:ext cx="5080302" cy="1569660"/>
+            <a:ext cx="5043432" cy="1569660"/>
           </a:xfrm>
           <a:prstGeom prst="rect">
             <a:avLst/>
@@ -5176,16 +5054,20 @@
           <a:lstStyle/>
           <a:p>
             <a:r>
+              <a:rPr lang="en-US" sz="2400" dirty="0" err="1"/>
+              <a:t>n</a:t>
+            </a:r>
+            <a:r>
               <a:rPr lang="en-US" sz="2400" dirty="0" err="1" smtClean="0"/>
-              <a:t>Numba</a:t>
+              <a:t>umba</a:t>
             </a:r>
             <a:r>
               <a:rPr lang="en-US" sz="2400" dirty="0" smtClean="0"/>
-              <a:t> implementation </a:t>
+              <a:t> </a:t>
             </a:r>
             <a:r>
               <a:rPr lang="en-US" sz="2400" dirty="0" smtClean="0"/>
-              <a:t>is much faster!</a:t>
+              <a:t>implementation is much faster!</a:t>
             </a:r>
           </a:p>
           <a:p>
@@ -5347,7 +5229,7 @@
 </p:sld>
 </file>
 
-<file path=ppt/slides/slide6.xml><?xml version="1.0" encoding="utf-8"?>
+<file path=ppt/slides/slide5.xml><?xml version="1.0" encoding="utf-8"?>
 <p:sld xmlns:a="http://schemas.openxmlformats.org/drawingml/2006/main" xmlns:r="http://schemas.openxmlformats.org/officeDocument/2006/relationships" xmlns:p="http://schemas.openxmlformats.org/presentationml/2006/main">
   <p:cSld>
     <p:spTree>
@@ -5405,7 +5287,7 @@
             <a:fld id="{B6F15528-21DE-4FAA-801E-634DDDAF4B2B}" type="slidenum">
               <a:rPr lang="en-US" smtClean="0"/>
               <a:pPr/>
-              <a:t>6</a:t>
+              <a:t>5</a:t>
             </a:fld>
             <a:endParaRPr lang="en-US"/>
           </a:p>
@@ -6362,6 +6244,1631 @@
     </p:tnLst>
     <p:bldLst>
       <p:bldP spid="10" grpId="0" animBg="1"/>
+    </p:bldLst>
+  </p:timing>
+</p:sld>
+</file>
+
+<file path=ppt/slides/slide6.xml><?xml version="1.0" encoding="utf-8"?>
+<p:sld xmlns:a="http://schemas.openxmlformats.org/drawingml/2006/main" xmlns:r="http://schemas.openxmlformats.org/officeDocument/2006/relationships" xmlns:p="http://schemas.openxmlformats.org/presentationml/2006/main">
+  <p:cSld>
+    <p:spTree>
+      <p:nvGrpSpPr>
+        <p:cNvPr id="1" name=""/>
+        <p:cNvGrpSpPr/>
+        <p:nvPr/>
+      </p:nvGrpSpPr>
+      <p:grpSpPr>
+        <a:xfrm>
+          <a:off x="0" y="0"/>
+          <a:ext cx="0" cy="0"/>
+          <a:chOff x="0" y="0"/>
+          <a:chExt cx="0" cy="0"/>
+        </a:xfrm>
+      </p:grpSpPr>
+      <p:sp>
+        <p:nvSpPr>
+          <p:cNvPr id="2" name="Title 1"/>
+          <p:cNvSpPr>
+            <a:spLocks noGrp="1"/>
+          </p:cNvSpPr>
+          <p:nvPr>
+            <p:ph type="title"/>
+          </p:nvPr>
+        </p:nvSpPr>
+        <p:spPr/>
+        <p:txBody>
+          <a:bodyPr/>
+          <a:lstStyle/>
+          <a:p>
+            <a:r>
+              <a:rPr lang="en-US" dirty="0" smtClean="0"/>
+              <a:t>Does it always work?</a:t>
+            </a:r>
+            <a:endParaRPr lang="nl-BE" dirty="0"/>
+          </a:p>
+        </p:txBody>
+      </p:sp>
+      <p:sp>
+        <p:nvSpPr>
+          <p:cNvPr id="5" name="Slide Number Placeholder 4"/>
+          <p:cNvSpPr>
+            <a:spLocks noGrp="1"/>
+          </p:cNvSpPr>
+          <p:nvPr>
+            <p:ph type="sldNum" sz="quarter" idx="12"/>
+          </p:nvPr>
+        </p:nvSpPr>
+        <p:spPr/>
+        <p:txBody>
+          <a:bodyPr/>
+          <a:lstStyle/>
+          <a:p>
+            <a:fld id="{B6F15528-21DE-4FAA-801E-634DDDAF4B2B}" type="slidenum">
+              <a:rPr lang="en-US" smtClean="0"/>
+              <a:pPr/>
+              <a:t>6</a:t>
+            </a:fld>
+            <a:endParaRPr lang="en-US"/>
+          </a:p>
+        </p:txBody>
+      </p:sp>
+      <p:grpSp>
+        <p:nvGrpSpPr>
+          <p:cNvPr id="8" name="Group 7"/>
+          <p:cNvGrpSpPr/>
+          <p:nvPr/>
+        </p:nvGrpSpPr>
+        <p:grpSpPr>
+          <a:xfrm>
+            <a:off x="4799136" y="1301265"/>
+            <a:ext cx="3887603" cy="5509200"/>
+            <a:chOff x="304800" y="1371600"/>
+            <a:chExt cx="3887603" cy="5509200"/>
+          </a:xfrm>
+          <a:solidFill>
+            <a:schemeClr val="bg1">
+              <a:lumMod val="85000"/>
+            </a:schemeClr>
+          </a:solidFill>
+        </p:grpSpPr>
+        <p:sp>
+          <p:nvSpPr>
+            <p:cNvPr id="3" name="TextBox 2"/>
+            <p:cNvSpPr txBox="1"/>
+            <p:nvPr/>
+          </p:nvSpPr>
+          <p:spPr>
+            <a:xfrm>
+              <a:off x="304800" y="1371600"/>
+              <a:ext cx="3887603" cy="5509200"/>
+            </a:xfrm>
+            <a:prstGeom prst="rect">
+              <a:avLst/>
+            </a:prstGeom>
+            <a:grpFill/>
+            <a:ln>
+              <a:solidFill>
+                <a:schemeClr val="tx1"/>
+              </a:solidFill>
+            </a:ln>
+          </p:spPr>
+          <p:txBody>
+            <a:bodyPr wrap="none" rtlCol="0">
+              <a:spAutoFit/>
+            </a:bodyPr>
+            <a:lstStyle/>
+            <a:p>
+              <a:r>
+                <a:rPr lang="nl-BE" sz="1600" b="1" dirty="0">
+                  <a:solidFill>
+                    <a:srgbClr val="C00000"/>
+                  </a:solidFill>
+                  <a:latin typeface="Courier New" panose="02070309020205020404" pitchFamily="49" charset="0"/>
+                  <a:cs typeface="Courier New" panose="02070309020205020404" pitchFamily="49" charset="0"/>
+                </a:rPr>
+                <a:t>from array import array</a:t>
+              </a:r>
+            </a:p>
+            <a:p>
+              <a:r>
+                <a:rPr lang="nl-BE" sz="1600" dirty="0" smtClean="0">
+                  <a:latin typeface="Courier New" panose="02070309020205020404" pitchFamily="49" charset="0"/>
+                  <a:cs typeface="Courier New" panose="02070309020205020404" pitchFamily="49" charset="0"/>
+                </a:rPr>
+                <a:t>from </a:t>
+              </a:r>
+              <a:r>
+                <a:rPr lang="nl-BE" sz="1600" dirty="0" smtClean="0">
+                  <a:latin typeface="Courier New" panose="02070309020205020404" pitchFamily="49" charset="0"/>
+                  <a:cs typeface="Courier New" panose="02070309020205020404" pitchFamily="49" charset="0"/>
+                </a:rPr>
+                <a:t>numba import jit</a:t>
+              </a:r>
+            </a:p>
+            <a:p>
+              <a:endParaRPr lang="nl-BE" sz="1600" dirty="0">
+                <a:latin typeface="Courier New" panose="02070309020205020404" pitchFamily="49" charset="0"/>
+                <a:cs typeface="Courier New" panose="02070309020205020404" pitchFamily="49" charset="0"/>
+              </a:endParaRPr>
+            </a:p>
+            <a:p>
+              <a:r>
+                <a:rPr lang="nl-BE" sz="1600" dirty="0" smtClean="0">
+                  <a:latin typeface="Courier New" panose="02070309020205020404" pitchFamily="49" charset="0"/>
+                  <a:cs typeface="Courier New" panose="02070309020205020404" pitchFamily="49" charset="0"/>
+                </a:rPr>
+                <a:t>@jit</a:t>
+              </a:r>
+            </a:p>
+            <a:p>
+              <a:r>
+                <a:rPr lang="nl-BE" sz="1600" dirty="0" smtClean="0">
+                  <a:latin typeface="Courier New" panose="02070309020205020404" pitchFamily="49" charset="0"/>
+                  <a:cs typeface="Courier New" panose="02070309020205020404" pitchFamily="49" charset="0"/>
+                </a:rPr>
+                <a:t>def primes(kmax):</a:t>
+              </a:r>
+            </a:p>
+            <a:p>
+              <a:r>
+                <a:rPr lang="nl-BE" sz="1600" dirty="0" smtClean="0">
+                  <a:latin typeface="Courier New" panose="02070309020205020404" pitchFamily="49" charset="0"/>
+                  <a:cs typeface="Courier New" panose="02070309020205020404" pitchFamily="49" charset="0"/>
+                </a:rPr>
+                <a:t>    p = </a:t>
+              </a:r>
+              <a:r>
+                <a:rPr lang="nl-BE" sz="1600" b="1" dirty="0">
+                  <a:solidFill>
+                    <a:srgbClr val="C00000"/>
+                  </a:solidFill>
+                  <a:latin typeface="Courier New" panose="02070309020205020404" pitchFamily="49" charset="0"/>
+                  <a:cs typeface="Courier New" panose="02070309020205020404" pitchFamily="49" charset="0"/>
+                </a:rPr>
+                <a:t>array('i', [0]*1000)</a:t>
+              </a:r>
+              <a:endParaRPr lang="nl-BE" sz="1600" b="1" dirty="0" smtClean="0">
+                <a:solidFill>
+                  <a:srgbClr val="C00000"/>
+                </a:solidFill>
+                <a:latin typeface="Courier New" panose="02070309020205020404" pitchFamily="49" charset="0"/>
+                <a:cs typeface="Courier New" panose="02070309020205020404" pitchFamily="49" charset="0"/>
+              </a:endParaRPr>
+            </a:p>
+            <a:p>
+              <a:r>
+                <a:rPr lang="nl-BE" sz="1600" dirty="0" smtClean="0">
+                  <a:latin typeface="Courier New" panose="02070309020205020404" pitchFamily="49" charset="0"/>
+                  <a:cs typeface="Courier New" panose="02070309020205020404" pitchFamily="49" charset="0"/>
+                </a:rPr>
+                <a:t>    result = []</a:t>
+              </a:r>
+            </a:p>
+            <a:p>
+              <a:r>
+                <a:rPr lang="nl-BE" sz="1600" dirty="0" smtClean="0">
+                  <a:latin typeface="Courier New" panose="02070309020205020404" pitchFamily="49" charset="0"/>
+                  <a:cs typeface="Courier New" panose="02070309020205020404" pitchFamily="49" charset="0"/>
+                </a:rPr>
+                <a:t>    if kmax &gt; 1000:</a:t>
+              </a:r>
+            </a:p>
+            <a:p>
+              <a:r>
+                <a:rPr lang="nl-BE" sz="1600" dirty="0" smtClean="0">
+                  <a:latin typeface="Courier New" panose="02070309020205020404" pitchFamily="49" charset="0"/>
+                  <a:cs typeface="Courier New" panose="02070309020205020404" pitchFamily="49" charset="0"/>
+                </a:rPr>
+                <a:t>        kmax = 1000</a:t>
+              </a:r>
+            </a:p>
+            <a:p>
+              <a:r>
+                <a:rPr lang="nl-BE" sz="1600" dirty="0" smtClean="0">
+                  <a:latin typeface="Courier New" panose="02070309020205020404" pitchFamily="49" charset="0"/>
+                  <a:cs typeface="Courier New" panose="02070309020205020404" pitchFamily="49" charset="0"/>
+                </a:rPr>
+                <a:t>    k = 0</a:t>
+              </a:r>
+            </a:p>
+            <a:p>
+              <a:r>
+                <a:rPr lang="nl-BE" sz="1600" dirty="0" smtClean="0">
+                  <a:latin typeface="Courier New" panose="02070309020205020404" pitchFamily="49" charset="0"/>
+                  <a:cs typeface="Courier New" panose="02070309020205020404" pitchFamily="49" charset="0"/>
+                </a:rPr>
+                <a:t>    n = 2</a:t>
+              </a:r>
+            </a:p>
+            <a:p>
+              <a:r>
+                <a:rPr lang="nl-BE" sz="1600" dirty="0" smtClean="0">
+                  <a:latin typeface="Courier New" panose="02070309020205020404" pitchFamily="49" charset="0"/>
+                  <a:cs typeface="Courier New" panose="02070309020205020404" pitchFamily="49" charset="0"/>
+                </a:rPr>
+                <a:t>    while k &lt; kmax:</a:t>
+              </a:r>
+            </a:p>
+            <a:p>
+              <a:r>
+                <a:rPr lang="nl-BE" sz="1600" dirty="0" smtClean="0">
+                  <a:latin typeface="Courier New" panose="02070309020205020404" pitchFamily="49" charset="0"/>
+                  <a:cs typeface="Courier New" panose="02070309020205020404" pitchFamily="49" charset="0"/>
+                </a:rPr>
+                <a:t>        i = 0</a:t>
+              </a:r>
+            </a:p>
+            <a:p>
+              <a:r>
+                <a:rPr lang="nl-BE" sz="1600" dirty="0" smtClean="0">
+                  <a:latin typeface="Courier New" panose="02070309020205020404" pitchFamily="49" charset="0"/>
+                  <a:cs typeface="Courier New" panose="02070309020205020404" pitchFamily="49" charset="0"/>
+                </a:rPr>
+                <a:t>        while (i &lt; k and</a:t>
+              </a:r>
+            </a:p>
+            <a:p>
+              <a:r>
+                <a:rPr lang="nl-BE" sz="1600" dirty="0" smtClean="0">
+                  <a:latin typeface="Courier New" panose="02070309020205020404" pitchFamily="49" charset="0"/>
+                  <a:cs typeface="Courier New" panose="02070309020205020404" pitchFamily="49" charset="0"/>
+                </a:rPr>
+                <a:t>               n % p[i] != 0):</a:t>
+              </a:r>
+            </a:p>
+            <a:p>
+              <a:r>
+                <a:rPr lang="nl-BE" sz="1600" dirty="0" smtClean="0">
+                  <a:latin typeface="Courier New" panose="02070309020205020404" pitchFamily="49" charset="0"/>
+                  <a:cs typeface="Courier New" panose="02070309020205020404" pitchFamily="49" charset="0"/>
+                </a:rPr>
+                <a:t>            i = i + 1</a:t>
+              </a:r>
+            </a:p>
+            <a:p>
+              <a:r>
+                <a:rPr lang="nl-BE" sz="1600" dirty="0" smtClean="0">
+                  <a:latin typeface="Courier New" panose="02070309020205020404" pitchFamily="49" charset="0"/>
+                  <a:cs typeface="Courier New" panose="02070309020205020404" pitchFamily="49" charset="0"/>
+                </a:rPr>
+                <a:t>        if i == k:</a:t>
+              </a:r>
+            </a:p>
+            <a:p>
+              <a:r>
+                <a:rPr lang="nl-BE" sz="1600" dirty="0" smtClean="0">
+                  <a:latin typeface="Courier New" panose="02070309020205020404" pitchFamily="49" charset="0"/>
+                  <a:cs typeface="Courier New" panose="02070309020205020404" pitchFamily="49" charset="0"/>
+                </a:rPr>
+                <a:t>            p[k] = n</a:t>
+              </a:r>
+            </a:p>
+            <a:p>
+              <a:r>
+                <a:rPr lang="nl-BE" sz="1600" dirty="0" smtClean="0">
+                  <a:latin typeface="Courier New" panose="02070309020205020404" pitchFamily="49" charset="0"/>
+                  <a:cs typeface="Courier New" panose="02070309020205020404" pitchFamily="49" charset="0"/>
+                </a:rPr>
+                <a:t>            k = k + 1</a:t>
+              </a:r>
+            </a:p>
+            <a:p>
+              <a:r>
+                <a:rPr lang="nl-BE" sz="1600" dirty="0" smtClean="0">
+                  <a:latin typeface="Courier New" panose="02070309020205020404" pitchFamily="49" charset="0"/>
+                  <a:cs typeface="Courier New" panose="02070309020205020404" pitchFamily="49" charset="0"/>
+                </a:rPr>
+                <a:t>            result.append(n)</a:t>
+              </a:r>
+            </a:p>
+            <a:p>
+              <a:r>
+                <a:rPr lang="nl-BE" sz="1600" dirty="0" smtClean="0">
+                  <a:latin typeface="Courier New" panose="02070309020205020404" pitchFamily="49" charset="0"/>
+                  <a:cs typeface="Courier New" panose="02070309020205020404" pitchFamily="49" charset="0"/>
+                </a:rPr>
+                <a:t>        n = n + 1</a:t>
+              </a:r>
+            </a:p>
+            <a:p>
+              <a:r>
+                <a:rPr lang="nl-BE" sz="1600" dirty="0" smtClean="0">
+                  <a:latin typeface="Courier New" panose="02070309020205020404" pitchFamily="49" charset="0"/>
+                  <a:cs typeface="Courier New" panose="02070309020205020404" pitchFamily="49" charset="0"/>
+                </a:rPr>
+                <a:t>    return result</a:t>
+              </a:r>
+              <a:endParaRPr lang="nl-BE" sz="1600" dirty="0">
+                <a:latin typeface="Courier New" panose="02070309020205020404" pitchFamily="49" charset="0"/>
+                <a:cs typeface="Courier New" panose="02070309020205020404" pitchFamily="49" charset="0"/>
+              </a:endParaRPr>
+            </a:p>
+          </p:txBody>
+        </p:sp>
+        <p:sp>
+          <p:nvSpPr>
+            <p:cNvPr id="6" name="TextBox 5"/>
+            <p:cNvSpPr txBox="1"/>
+            <p:nvPr/>
+          </p:nvSpPr>
+          <p:spPr>
+            <a:xfrm>
+              <a:off x="3014773" y="6573023"/>
+              <a:ext cx="1177630" cy="307777"/>
+            </a:xfrm>
+            <a:prstGeom prst="rect">
+              <a:avLst/>
+            </a:prstGeom>
+            <a:solidFill>
+              <a:schemeClr val="bg1"/>
+            </a:solidFill>
+            <a:ln>
+              <a:solidFill>
+                <a:schemeClr val="tx1"/>
+              </a:solidFill>
+            </a:ln>
+          </p:spPr>
+          <p:txBody>
+            <a:bodyPr wrap="none" rtlCol="0">
+              <a:spAutoFit/>
+            </a:bodyPr>
+            <a:lstStyle/>
+            <a:p>
+              <a:r>
+                <a:rPr lang="en-US" sz="1400" dirty="0" smtClean="0"/>
+                <a:t>primes_na.py</a:t>
+              </a:r>
+              <a:endParaRPr lang="nl-BE" sz="1400" dirty="0"/>
+            </a:p>
+          </p:txBody>
+        </p:sp>
+      </p:grpSp>
+      <p:grpSp>
+        <p:nvGrpSpPr>
+          <p:cNvPr id="11" name="Group 10"/>
+          <p:cNvGrpSpPr/>
+          <p:nvPr/>
+        </p:nvGrpSpPr>
+        <p:grpSpPr>
+          <a:xfrm>
+            <a:off x="451964" y="1297481"/>
+            <a:ext cx="3887603" cy="5513272"/>
+            <a:chOff x="304800" y="1371600"/>
+            <a:chExt cx="3887603" cy="5513272"/>
+          </a:xfrm>
+          <a:solidFill>
+            <a:schemeClr val="bg1">
+              <a:lumMod val="85000"/>
+            </a:schemeClr>
+          </a:solidFill>
+        </p:grpSpPr>
+        <p:sp>
+          <p:nvSpPr>
+            <p:cNvPr id="12" name="TextBox 11"/>
+            <p:cNvSpPr txBox="1"/>
+            <p:nvPr/>
+          </p:nvSpPr>
+          <p:spPr>
+            <a:xfrm>
+              <a:off x="304800" y="1371600"/>
+              <a:ext cx="3887603" cy="5509200"/>
+            </a:xfrm>
+            <a:prstGeom prst="rect">
+              <a:avLst/>
+            </a:prstGeom>
+            <a:grpFill/>
+            <a:ln>
+              <a:solidFill>
+                <a:schemeClr val="tx1"/>
+              </a:solidFill>
+            </a:ln>
+          </p:spPr>
+          <p:txBody>
+            <a:bodyPr wrap="none" rtlCol="0">
+              <a:spAutoFit/>
+            </a:bodyPr>
+            <a:lstStyle/>
+            <a:p>
+              <a:r>
+                <a:rPr lang="nl-BE" sz="1600" dirty="0" smtClean="0">
+                  <a:latin typeface="Courier New" panose="02070309020205020404" pitchFamily="49" charset="0"/>
+                  <a:cs typeface="Courier New" panose="02070309020205020404" pitchFamily="49" charset="0"/>
+                </a:rPr>
+                <a:t>import numpy as np</a:t>
+              </a:r>
+            </a:p>
+            <a:p>
+              <a:r>
+                <a:rPr lang="nl-BE" sz="1600" dirty="0" smtClean="0">
+                  <a:latin typeface="Courier New" panose="02070309020205020404" pitchFamily="49" charset="0"/>
+                  <a:cs typeface="Courier New" panose="02070309020205020404" pitchFamily="49" charset="0"/>
+                </a:rPr>
+                <a:t>from numba import jit</a:t>
+              </a:r>
+            </a:p>
+            <a:p>
+              <a:endParaRPr lang="nl-BE" sz="1600" dirty="0">
+                <a:latin typeface="Courier New" panose="02070309020205020404" pitchFamily="49" charset="0"/>
+                <a:cs typeface="Courier New" panose="02070309020205020404" pitchFamily="49" charset="0"/>
+              </a:endParaRPr>
+            </a:p>
+            <a:p>
+              <a:r>
+                <a:rPr lang="nl-BE" sz="1600" dirty="0" smtClean="0">
+                  <a:latin typeface="Courier New" panose="02070309020205020404" pitchFamily="49" charset="0"/>
+                  <a:cs typeface="Courier New" panose="02070309020205020404" pitchFamily="49" charset="0"/>
+                </a:rPr>
+                <a:t>@jit</a:t>
+              </a:r>
+            </a:p>
+            <a:p>
+              <a:r>
+                <a:rPr lang="nl-BE" sz="1600" dirty="0" smtClean="0">
+                  <a:latin typeface="Courier New" panose="02070309020205020404" pitchFamily="49" charset="0"/>
+                  <a:cs typeface="Courier New" panose="02070309020205020404" pitchFamily="49" charset="0"/>
+                </a:rPr>
+                <a:t>def primes(kmax):</a:t>
+              </a:r>
+            </a:p>
+            <a:p>
+              <a:r>
+                <a:rPr lang="nl-BE" sz="1600" dirty="0" smtClean="0">
+                  <a:latin typeface="Courier New" panose="02070309020205020404" pitchFamily="49" charset="0"/>
+                  <a:cs typeface="Courier New" panose="02070309020205020404" pitchFamily="49" charset="0"/>
+                </a:rPr>
+                <a:t>    p = np.zeros(1000)</a:t>
+              </a:r>
+            </a:p>
+            <a:p>
+              <a:r>
+                <a:rPr lang="nl-BE" sz="1600" dirty="0" smtClean="0">
+                  <a:latin typeface="Courier New" panose="02070309020205020404" pitchFamily="49" charset="0"/>
+                  <a:cs typeface="Courier New" panose="02070309020205020404" pitchFamily="49" charset="0"/>
+                </a:rPr>
+                <a:t>    result = []</a:t>
+              </a:r>
+            </a:p>
+            <a:p>
+              <a:r>
+                <a:rPr lang="nl-BE" sz="1600" dirty="0" smtClean="0">
+                  <a:latin typeface="Courier New" panose="02070309020205020404" pitchFamily="49" charset="0"/>
+                  <a:cs typeface="Courier New" panose="02070309020205020404" pitchFamily="49" charset="0"/>
+                </a:rPr>
+                <a:t>    if kmax &gt; 1000:</a:t>
+              </a:r>
+            </a:p>
+            <a:p>
+              <a:r>
+                <a:rPr lang="nl-BE" sz="1600" dirty="0" smtClean="0">
+                  <a:latin typeface="Courier New" panose="02070309020205020404" pitchFamily="49" charset="0"/>
+                  <a:cs typeface="Courier New" panose="02070309020205020404" pitchFamily="49" charset="0"/>
+                </a:rPr>
+                <a:t>        kmax = 1000</a:t>
+              </a:r>
+            </a:p>
+            <a:p>
+              <a:r>
+                <a:rPr lang="nl-BE" sz="1600" dirty="0" smtClean="0">
+                  <a:latin typeface="Courier New" panose="02070309020205020404" pitchFamily="49" charset="0"/>
+                  <a:cs typeface="Courier New" panose="02070309020205020404" pitchFamily="49" charset="0"/>
+                </a:rPr>
+                <a:t>    k = 0</a:t>
+              </a:r>
+            </a:p>
+            <a:p>
+              <a:r>
+                <a:rPr lang="nl-BE" sz="1600" dirty="0" smtClean="0">
+                  <a:latin typeface="Courier New" panose="02070309020205020404" pitchFamily="49" charset="0"/>
+                  <a:cs typeface="Courier New" panose="02070309020205020404" pitchFamily="49" charset="0"/>
+                </a:rPr>
+                <a:t>    n = 2</a:t>
+              </a:r>
+            </a:p>
+            <a:p>
+              <a:r>
+                <a:rPr lang="nl-BE" sz="1600" dirty="0" smtClean="0">
+                  <a:latin typeface="Courier New" panose="02070309020205020404" pitchFamily="49" charset="0"/>
+                  <a:cs typeface="Courier New" panose="02070309020205020404" pitchFamily="49" charset="0"/>
+                </a:rPr>
+                <a:t>    while k &lt; kmax:</a:t>
+              </a:r>
+            </a:p>
+            <a:p>
+              <a:r>
+                <a:rPr lang="nl-BE" sz="1600" dirty="0" smtClean="0">
+                  <a:latin typeface="Courier New" panose="02070309020205020404" pitchFamily="49" charset="0"/>
+                  <a:cs typeface="Courier New" panose="02070309020205020404" pitchFamily="49" charset="0"/>
+                </a:rPr>
+                <a:t>        i = 0</a:t>
+              </a:r>
+            </a:p>
+            <a:p>
+              <a:r>
+                <a:rPr lang="nl-BE" sz="1600" dirty="0" smtClean="0">
+                  <a:latin typeface="Courier New" panose="02070309020205020404" pitchFamily="49" charset="0"/>
+                  <a:cs typeface="Courier New" panose="02070309020205020404" pitchFamily="49" charset="0"/>
+                </a:rPr>
+                <a:t>        while (i &lt; k and</a:t>
+              </a:r>
+            </a:p>
+            <a:p>
+              <a:r>
+                <a:rPr lang="nl-BE" sz="1600" dirty="0" smtClean="0">
+                  <a:latin typeface="Courier New" panose="02070309020205020404" pitchFamily="49" charset="0"/>
+                  <a:cs typeface="Courier New" panose="02070309020205020404" pitchFamily="49" charset="0"/>
+                </a:rPr>
+                <a:t>               n % p[i] != 0):</a:t>
+              </a:r>
+            </a:p>
+            <a:p>
+              <a:r>
+                <a:rPr lang="nl-BE" sz="1600" dirty="0" smtClean="0">
+                  <a:latin typeface="Courier New" panose="02070309020205020404" pitchFamily="49" charset="0"/>
+                  <a:cs typeface="Courier New" panose="02070309020205020404" pitchFamily="49" charset="0"/>
+                </a:rPr>
+                <a:t>            i = i + 1</a:t>
+              </a:r>
+            </a:p>
+            <a:p>
+              <a:r>
+                <a:rPr lang="nl-BE" sz="1600" dirty="0" smtClean="0">
+                  <a:latin typeface="Courier New" panose="02070309020205020404" pitchFamily="49" charset="0"/>
+                  <a:cs typeface="Courier New" panose="02070309020205020404" pitchFamily="49" charset="0"/>
+                </a:rPr>
+                <a:t>        if i == k:</a:t>
+              </a:r>
+            </a:p>
+            <a:p>
+              <a:r>
+                <a:rPr lang="nl-BE" sz="1600" dirty="0" smtClean="0">
+                  <a:latin typeface="Courier New" panose="02070309020205020404" pitchFamily="49" charset="0"/>
+                  <a:cs typeface="Courier New" panose="02070309020205020404" pitchFamily="49" charset="0"/>
+                </a:rPr>
+                <a:t>            p[k] = n</a:t>
+              </a:r>
+            </a:p>
+            <a:p>
+              <a:r>
+                <a:rPr lang="nl-BE" sz="1600" dirty="0" smtClean="0">
+                  <a:latin typeface="Courier New" panose="02070309020205020404" pitchFamily="49" charset="0"/>
+                  <a:cs typeface="Courier New" panose="02070309020205020404" pitchFamily="49" charset="0"/>
+                </a:rPr>
+                <a:t>            k = k + 1</a:t>
+              </a:r>
+            </a:p>
+            <a:p>
+              <a:r>
+                <a:rPr lang="nl-BE" sz="1600" dirty="0" smtClean="0">
+                  <a:latin typeface="Courier New" panose="02070309020205020404" pitchFamily="49" charset="0"/>
+                  <a:cs typeface="Courier New" panose="02070309020205020404" pitchFamily="49" charset="0"/>
+                </a:rPr>
+                <a:t>            result.append(n)</a:t>
+              </a:r>
+            </a:p>
+            <a:p>
+              <a:r>
+                <a:rPr lang="nl-BE" sz="1600" dirty="0" smtClean="0">
+                  <a:latin typeface="Courier New" panose="02070309020205020404" pitchFamily="49" charset="0"/>
+                  <a:cs typeface="Courier New" panose="02070309020205020404" pitchFamily="49" charset="0"/>
+                </a:rPr>
+                <a:t>        n = n + 1</a:t>
+              </a:r>
+            </a:p>
+            <a:p>
+              <a:r>
+                <a:rPr lang="nl-BE" sz="1600" dirty="0" smtClean="0">
+                  <a:latin typeface="Courier New" panose="02070309020205020404" pitchFamily="49" charset="0"/>
+                  <a:cs typeface="Courier New" panose="02070309020205020404" pitchFamily="49" charset="0"/>
+                </a:rPr>
+                <a:t>    return result</a:t>
+              </a:r>
+              <a:endParaRPr lang="nl-BE" sz="1600" dirty="0">
+                <a:latin typeface="Courier New" panose="02070309020205020404" pitchFamily="49" charset="0"/>
+                <a:cs typeface="Courier New" panose="02070309020205020404" pitchFamily="49" charset="0"/>
+              </a:endParaRPr>
+            </a:p>
+          </p:txBody>
+        </p:sp>
+        <p:sp>
+          <p:nvSpPr>
+            <p:cNvPr id="13" name="TextBox 12"/>
+            <p:cNvSpPr txBox="1"/>
+            <p:nvPr/>
+          </p:nvSpPr>
+          <p:spPr>
+            <a:xfrm>
+              <a:off x="3101335" y="6577095"/>
+              <a:ext cx="1091068" cy="307777"/>
+            </a:xfrm>
+            <a:prstGeom prst="rect">
+              <a:avLst/>
+            </a:prstGeom>
+            <a:solidFill>
+              <a:schemeClr val="bg1"/>
+            </a:solidFill>
+            <a:ln>
+              <a:solidFill>
+                <a:schemeClr val="tx1"/>
+              </a:solidFill>
+            </a:ln>
+          </p:spPr>
+          <p:txBody>
+            <a:bodyPr wrap="none" rtlCol="0">
+              <a:spAutoFit/>
+            </a:bodyPr>
+            <a:lstStyle/>
+            <a:p>
+              <a:r>
+                <a:rPr lang="en-US" sz="1400" dirty="0" smtClean="0"/>
+                <a:t>primes_n.py</a:t>
+              </a:r>
+              <a:endParaRPr lang="nl-BE" sz="1400" dirty="0"/>
+            </a:p>
+          </p:txBody>
+        </p:sp>
+      </p:grpSp>
+      <p:grpSp>
+        <p:nvGrpSpPr>
+          <p:cNvPr id="18" name="Group 17"/>
+          <p:cNvGrpSpPr/>
+          <p:nvPr/>
+        </p:nvGrpSpPr>
+        <p:grpSpPr>
+          <a:xfrm>
+            <a:off x="3657600" y="2696307"/>
+            <a:ext cx="1341357" cy="882085"/>
+            <a:chOff x="3657600" y="2696307"/>
+            <a:chExt cx="1341357" cy="882085"/>
+          </a:xfrm>
+        </p:grpSpPr>
+        <p:sp>
+          <p:nvSpPr>
+            <p:cNvPr id="14" name="TextBox 13"/>
+            <p:cNvSpPr txBox="1"/>
+            <p:nvPr/>
+          </p:nvSpPr>
+          <p:spPr>
+            <a:xfrm>
+              <a:off x="3867413" y="2932061"/>
+              <a:ext cx="859210" cy="646331"/>
+            </a:xfrm>
+            <a:prstGeom prst="rect">
+              <a:avLst/>
+            </a:prstGeom>
+            <a:solidFill>
+              <a:schemeClr val="bg1"/>
+            </a:solidFill>
+            <a:ln>
+              <a:solidFill>
+                <a:srgbClr val="C00000"/>
+              </a:solidFill>
+            </a:ln>
+          </p:spPr>
+          <p:txBody>
+            <a:bodyPr wrap="none" rtlCol="0">
+              <a:spAutoFit/>
+            </a:bodyPr>
+            <a:lstStyle/>
+            <a:p>
+              <a:r>
+                <a:rPr lang="en-US" dirty="0" smtClean="0">
+                  <a:solidFill>
+                    <a:srgbClr val="C00000"/>
+                  </a:solidFill>
+                </a:rPr>
+                <a:t>Minor</a:t>
+              </a:r>
+              <a:br>
+                <a:rPr lang="en-US" dirty="0" smtClean="0">
+                  <a:solidFill>
+                    <a:srgbClr val="C00000"/>
+                  </a:solidFill>
+                </a:rPr>
+              </a:br>
+              <a:r>
+                <a:rPr lang="en-US" dirty="0" smtClean="0">
+                  <a:solidFill>
+                    <a:srgbClr val="C00000"/>
+                  </a:solidFill>
+                </a:rPr>
+                <a:t>change</a:t>
+              </a:r>
+              <a:endParaRPr lang="en-US" dirty="0">
+                <a:solidFill>
+                  <a:srgbClr val="C00000"/>
+                </a:solidFill>
+              </a:endParaRPr>
+            </a:p>
+          </p:txBody>
+        </p:sp>
+        <p:cxnSp>
+          <p:nvCxnSpPr>
+            <p:cNvPr id="16" name="Straight Arrow Connector 15"/>
+            <p:cNvCxnSpPr/>
+            <p:nvPr/>
+          </p:nvCxnSpPr>
+          <p:spPr>
+            <a:xfrm>
+              <a:off x="3657600" y="2696307"/>
+              <a:ext cx="1341357" cy="0"/>
+            </a:xfrm>
+            <a:prstGeom prst="straightConnector1">
+              <a:avLst/>
+            </a:prstGeom>
+            <a:ln w="50800">
+              <a:solidFill>
+                <a:srgbClr val="C00000"/>
+              </a:solidFill>
+              <a:tailEnd type="stealth" w="lg" len="lg"/>
+            </a:ln>
+          </p:spPr>
+          <p:style>
+            <a:lnRef idx="1">
+              <a:schemeClr val="accent1"/>
+            </a:lnRef>
+            <a:fillRef idx="0">
+              <a:schemeClr val="accent1"/>
+            </a:fillRef>
+            <a:effectRef idx="0">
+              <a:schemeClr val="accent1"/>
+            </a:effectRef>
+            <a:fontRef idx="minor">
+              <a:schemeClr val="tx1"/>
+            </a:fontRef>
+          </p:style>
+        </p:cxnSp>
+      </p:grpSp>
+    </p:spTree>
+    <p:extLst>
+      <p:ext uri="{BB962C8B-B14F-4D97-AF65-F5344CB8AC3E}">
+        <p14:creationId xmlns:p14="http://schemas.microsoft.com/office/powerpoint/2010/main" val="4197393939"/>
+      </p:ext>
+    </p:extLst>
+  </p:cSld>
+  <p:clrMapOvr>
+    <a:masterClrMapping/>
+  </p:clrMapOvr>
+  <p:timing>
+    <p:tnLst>
+      <p:par>
+        <p:cTn id="1" dur="indefinite" restart="never" nodeType="tmRoot">
+          <p:childTnLst>
+            <p:seq concurrent="1" nextAc="seek">
+              <p:cTn id="2" dur="indefinite" nodeType="mainSeq">
+                <p:childTnLst>
+                  <p:par>
+                    <p:cTn id="3" fill="hold">
+                      <p:stCondLst>
+                        <p:cond delay="indefinite"/>
+                      </p:stCondLst>
+                      <p:childTnLst>
+                        <p:par>
+                          <p:cTn id="4" fill="hold">
+                            <p:stCondLst>
+                              <p:cond delay="0"/>
+                            </p:stCondLst>
+                            <p:childTnLst>
+                              <p:par>
+                                <p:cTn id="5" presetID="1" presetClass="entr" presetSubtype="0" fill="hold" nodeType="clickEffect">
+                                  <p:stCondLst>
+                                    <p:cond delay="0"/>
+                                  </p:stCondLst>
+                                  <p:childTnLst>
+                                    <p:set>
+                                      <p:cBhvr>
+                                        <p:cTn id="6" dur="1" fill="hold">
+                                          <p:stCondLst>
+                                            <p:cond delay="0"/>
+                                          </p:stCondLst>
+                                        </p:cTn>
+                                        <p:tgtEl>
+                                          <p:spTgt spid="18"/>
+                                        </p:tgtEl>
+                                        <p:attrNameLst>
+                                          <p:attrName>style.visibility</p:attrName>
+                                        </p:attrNameLst>
+                                      </p:cBhvr>
+                                      <p:to>
+                                        <p:strVal val="visible"/>
+                                      </p:to>
+                                    </p:set>
+                                  </p:childTnLst>
+                                </p:cTn>
+                              </p:par>
+                            </p:childTnLst>
+                          </p:cTn>
+                        </p:par>
+                      </p:childTnLst>
+                    </p:cTn>
+                  </p:par>
+                </p:childTnLst>
+              </p:cTn>
+              <p:prevCondLst>
+                <p:cond evt="onPrev" delay="0">
+                  <p:tgtEl>
+                    <p:sldTgt/>
+                  </p:tgtEl>
+                </p:cond>
+              </p:prevCondLst>
+              <p:nextCondLst>
+                <p:cond evt="onNext" delay="0">
+                  <p:tgtEl>
+                    <p:sldTgt/>
+                  </p:tgtEl>
+                </p:cond>
+              </p:nextCondLst>
+            </p:seq>
+          </p:childTnLst>
+        </p:cTn>
+      </p:par>
+    </p:tnLst>
+  </p:timing>
+</p:sld>
+</file>
+
+<file path=ppt/slides/slide7.xml><?xml version="1.0" encoding="utf-8"?>
+<p:sld xmlns:a="http://schemas.openxmlformats.org/drawingml/2006/main" xmlns:r="http://schemas.openxmlformats.org/officeDocument/2006/relationships" xmlns:p="http://schemas.openxmlformats.org/presentationml/2006/main">
+  <p:cSld>
+    <p:spTree>
+      <p:nvGrpSpPr>
+        <p:cNvPr id="1" name=""/>
+        <p:cNvGrpSpPr/>
+        <p:nvPr/>
+      </p:nvGrpSpPr>
+      <p:grpSpPr>
+        <a:xfrm>
+          <a:off x="0" y="0"/>
+          <a:ext cx="0" cy="0"/>
+          <a:chOff x="0" y="0"/>
+          <a:chExt cx="0" cy="0"/>
+        </a:xfrm>
+      </p:grpSpPr>
+      <p:sp>
+        <p:nvSpPr>
+          <p:cNvPr id="2" name="Title 1"/>
+          <p:cNvSpPr>
+            <a:spLocks noGrp="1"/>
+          </p:cNvSpPr>
+          <p:nvPr>
+            <p:ph type="title"/>
+          </p:nvPr>
+        </p:nvSpPr>
+        <p:spPr/>
+        <p:txBody>
+          <a:bodyPr/>
+          <a:lstStyle/>
+          <a:p>
+            <a:r>
+              <a:rPr lang="en-US" dirty="0" smtClean="0"/>
+              <a:t>Does it always work: timings?</a:t>
+            </a:r>
+            <a:endParaRPr lang="nl-BE" dirty="0"/>
+          </a:p>
+        </p:txBody>
+      </p:sp>
+      <p:sp>
+        <p:nvSpPr>
+          <p:cNvPr id="3" name="Slide Number Placeholder 2"/>
+          <p:cNvSpPr>
+            <a:spLocks noGrp="1"/>
+          </p:cNvSpPr>
+          <p:nvPr>
+            <p:ph type="sldNum" sz="quarter" idx="12"/>
+          </p:nvPr>
+        </p:nvSpPr>
+        <p:spPr/>
+        <p:txBody>
+          <a:bodyPr/>
+          <a:lstStyle/>
+          <a:p>
+            <a:fld id="{B6F15528-21DE-4FAA-801E-634DDDAF4B2B}" type="slidenum">
+              <a:rPr lang="en-US" smtClean="0"/>
+              <a:pPr/>
+              <a:t>7</a:t>
+            </a:fld>
+            <a:endParaRPr lang="en-US"/>
+          </a:p>
+        </p:txBody>
+      </p:sp>
+      <p:sp>
+        <p:nvSpPr>
+          <p:cNvPr id="4" name="TextBox 3"/>
+          <p:cNvSpPr txBox="1"/>
+          <p:nvPr/>
+        </p:nvSpPr>
+        <p:spPr>
+          <a:xfrm>
+            <a:off x="533400" y="1676400"/>
+            <a:ext cx="6250429" cy="2862322"/>
+          </a:xfrm>
+          <a:prstGeom prst="rect">
+            <a:avLst/>
+          </a:prstGeom>
+          <a:solidFill>
+            <a:schemeClr val="tx1"/>
+          </a:solidFill>
+        </p:spPr>
+        <p:txBody>
+          <a:bodyPr wrap="none" rtlCol="0">
+            <a:spAutoFit/>
+          </a:bodyPr>
+          <a:lstStyle/>
+          <a:p>
+            <a:r>
+              <a:rPr lang="nl-BE" b="1" dirty="0">
+                <a:solidFill>
+                  <a:srgbClr val="00B050"/>
+                </a:solidFill>
+                <a:latin typeface="Courier New" panose="02070309020205020404" pitchFamily="49" charset="0"/>
+                <a:cs typeface="Courier New" panose="02070309020205020404" pitchFamily="49" charset="0"/>
+              </a:rPr>
+              <a:t>In [1]:</a:t>
+            </a:r>
+            <a:r>
+              <a:rPr lang="nl-BE" b="1" dirty="0">
+                <a:solidFill>
+                  <a:schemeClr val="bg1"/>
+                </a:solidFill>
+                <a:latin typeface="Courier New" panose="02070309020205020404" pitchFamily="49" charset="0"/>
+                <a:cs typeface="Courier New" panose="02070309020205020404" pitchFamily="49" charset="0"/>
+              </a:rPr>
+              <a:t> import </a:t>
+            </a:r>
+            <a:r>
+              <a:rPr lang="nl-BE" b="1" dirty="0" smtClean="0">
+                <a:solidFill>
+                  <a:schemeClr val="bg1"/>
+                </a:solidFill>
+                <a:latin typeface="Courier New" panose="02070309020205020404" pitchFamily="49" charset="0"/>
+                <a:cs typeface="Courier New" panose="02070309020205020404" pitchFamily="49" charset="0"/>
+              </a:rPr>
+              <a:t>primes_pa</a:t>
+            </a:r>
+            <a:endParaRPr lang="nl-BE" b="1" dirty="0">
+              <a:solidFill>
+                <a:schemeClr val="bg1"/>
+              </a:solidFill>
+              <a:latin typeface="Courier New" panose="02070309020205020404" pitchFamily="49" charset="0"/>
+              <a:cs typeface="Courier New" panose="02070309020205020404" pitchFamily="49" charset="0"/>
+            </a:endParaRPr>
+          </a:p>
+          <a:p>
+            <a:endParaRPr lang="nl-BE" b="1" dirty="0">
+              <a:solidFill>
+                <a:schemeClr val="bg1"/>
+              </a:solidFill>
+              <a:latin typeface="Courier New" panose="02070309020205020404" pitchFamily="49" charset="0"/>
+              <a:cs typeface="Courier New" panose="02070309020205020404" pitchFamily="49" charset="0"/>
+            </a:endParaRPr>
+          </a:p>
+          <a:p>
+            <a:r>
+              <a:rPr lang="nl-BE" b="1" dirty="0">
+                <a:solidFill>
+                  <a:srgbClr val="00B050"/>
+                </a:solidFill>
+                <a:latin typeface="Courier New" panose="02070309020205020404" pitchFamily="49" charset="0"/>
+                <a:cs typeface="Courier New" panose="02070309020205020404" pitchFamily="49" charset="0"/>
+              </a:rPr>
+              <a:t>In [2]:</a:t>
+            </a:r>
+            <a:r>
+              <a:rPr lang="nl-BE" b="1" dirty="0">
+                <a:solidFill>
+                  <a:schemeClr val="bg1"/>
+                </a:solidFill>
+                <a:latin typeface="Courier New" panose="02070309020205020404" pitchFamily="49" charset="0"/>
+                <a:cs typeface="Courier New" panose="02070309020205020404" pitchFamily="49" charset="0"/>
+              </a:rPr>
+              <a:t> import </a:t>
+            </a:r>
+            <a:r>
+              <a:rPr lang="nl-BE" b="1" dirty="0" smtClean="0">
+                <a:solidFill>
+                  <a:schemeClr val="bg1"/>
+                </a:solidFill>
+                <a:latin typeface="Courier New" panose="02070309020205020404" pitchFamily="49" charset="0"/>
+                <a:cs typeface="Courier New" panose="02070309020205020404" pitchFamily="49" charset="0"/>
+              </a:rPr>
+              <a:t>primes_na</a:t>
+            </a:r>
+            <a:endParaRPr lang="nl-BE" b="1" dirty="0">
+              <a:solidFill>
+                <a:schemeClr val="bg1"/>
+              </a:solidFill>
+              <a:latin typeface="Courier New" panose="02070309020205020404" pitchFamily="49" charset="0"/>
+              <a:cs typeface="Courier New" panose="02070309020205020404" pitchFamily="49" charset="0"/>
+            </a:endParaRPr>
+          </a:p>
+          <a:p>
+            <a:endParaRPr lang="nl-BE" b="1" dirty="0">
+              <a:solidFill>
+                <a:schemeClr val="bg1"/>
+              </a:solidFill>
+              <a:latin typeface="Courier New" panose="02070309020205020404" pitchFamily="49" charset="0"/>
+              <a:cs typeface="Courier New" panose="02070309020205020404" pitchFamily="49" charset="0"/>
+            </a:endParaRPr>
+          </a:p>
+          <a:p>
+            <a:r>
+              <a:rPr lang="nl-BE" b="1" dirty="0">
+                <a:solidFill>
+                  <a:srgbClr val="00B050"/>
+                </a:solidFill>
+                <a:latin typeface="Courier New" panose="02070309020205020404" pitchFamily="49" charset="0"/>
+                <a:cs typeface="Courier New" panose="02070309020205020404" pitchFamily="49" charset="0"/>
+              </a:rPr>
+              <a:t>In [3]:</a:t>
+            </a:r>
+            <a:r>
+              <a:rPr lang="nl-BE" b="1" dirty="0">
+                <a:solidFill>
+                  <a:schemeClr val="bg1"/>
+                </a:solidFill>
+                <a:latin typeface="Courier New" panose="02070309020205020404" pitchFamily="49" charset="0"/>
+                <a:cs typeface="Courier New" panose="02070309020205020404" pitchFamily="49" charset="0"/>
+              </a:rPr>
+              <a:t> %timeit </a:t>
+            </a:r>
+            <a:r>
+              <a:rPr lang="nl-BE" b="1" dirty="0" smtClean="0">
+                <a:solidFill>
+                  <a:schemeClr val="bg1"/>
+                </a:solidFill>
+                <a:latin typeface="Courier New" panose="02070309020205020404" pitchFamily="49" charset="0"/>
+                <a:cs typeface="Courier New" panose="02070309020205020404" pitchFamily="49" charset="0"/>
+              </a:rPr>
+              <a:t>primes_na.primes(1000</a:t>
+            </a:r>
+            <a:r>
+              <a:rPr lang="nl-BE" b="1" dirty="0">
+                <a:solidFill>
+                  <a:schemeClr val="bg1"/>
+                </a:solidFill>
+                <a:latin typeface="Courier New" panose="02070309020205020404" pitchFamily="49" charset="0"/>
+                <a:cs typeface="Courier New" panose="02070309020205020404" pitchFamily="49" charset="0"/>
+              </a:rPr>
+              <a:t>)</a:t>
+            </a:r>
+          </a:p>
+          <a:p>
+            <a:r>
+              <a:rPr lang="en-US" b="1" dirty="0" smtClean="0">
+                <a:solidFill>
+                  <a:srgbClr val="FF0000"/>
+                </a:solidFill>
+                <a:latin typeface="Courier New" panose="02070309020205020404" pitchFamily="49" charset="0"/>
+                <a:cs typeface="Courier New" panose="02070309020205020404" pitchFamily="49" charset="0"/>
+              </a:rPr>
+              <a:t>81.9 </a:t>
+            </a:r>
+            <a:r>
+              <a:rPr lang="en-US" b="1" dirty="0" err="1">
+                <a:solidFill>
+                  <a:srgbClr val="FF0000"/>
+                </a:solidFill>
+                <a:latin typeface="Courier New" panose="02070309020205020404" pitchFamily="49" charset="0"/>
+                <a:cs typeface="Courier New" panose="02070309020205020404" pitchFamily="49" charset="0"/>
+              </a:rPr>
+              <a:t>ms</a:t>
+            </a:r>
+            <a:r>
+              <a:rPr lang="en-US" b="1" dirty="0">
+                <a:solidFill>
+                  <a:schemeClr val="bg1"/>
+                </a:solidFill>
+                <a:latin typeface="Courier New" panose="02070309020205020404" pitchFamily="49" charset="0"/>
+                <a:cs typeface="Courier New" panose="02070309020205020404" pitchFamily="49" charset="0"/>
+              </a:rPr>
+              <a:t> ± 2.18 </a:t>
+            </a:r>
+            <a:r>
+              <a:rPr lang="en-US" b="1" dirty="0" err="1">
+                <a:solidFill>
+                  <a:schemeClr val="bg1"/>
+                </a:solidFill>
+                <a:latin typeface="Courier New" panose="02070309020205020404" pitchFamily="49" charset="0"/>
+                <a:cs typeface="Courier New" panose="02070309020205020404" pitchFamily="49" charset="0"/>
+              </a:rPr>
+              <a:t>ms</a:t>
+            </a:r>
+            <a:r>
+              <a:rPr lang="en-US" b="1" dirty="0">
+                <a:solidFill>
+                  <a:schemeClr val="bg1"/>
+                </a:solidFill>
+                <a:latin typeface="Courier New" panose="02070309020205020404" pitchFamily="49" charset="0"/>
+                <a:cs typeface="Courier New" panose="02070309020205020404" pitchFamily="49" charset="0"/>
+              </a:rPr>
+              <a:t> per loop (mean ± std. </a:t>
+            </a:r>
+            <a:r>
+              <a:rPr lang="en-US" b="1" dirty="0" smtClean="0">
+                <a:solidFill>
+                  <a:schemeClr val="bg1"/>
+                </a:solidFill>
+                <a:latin typeface="Courier New" panose="02070309020205020404" pitchFamily="49" charset="0"/>
+                <a:cs typeface="Courier New" panose="02070309020205020404" pitchFamily="49" charset="0"/>
+              </a:rPr>
+              <a:t>dev.</a:t>
+            </a:r>
+          </a:p>
+          <a:p>
+            <a:r>
+              <a:rPr lang="en-US" b="1" dirty="0">
+                <a:solidFill>
+                  <a:schemeClr val="bg1"/>
+                </a:solidFill>
+                <a:latin typeface="Courier New" panose="02070309020205020404" pitchFamily="49" charset="0"/>
+                <a:cs typeface="Courier New" panose="02070309020205020404" pitchFamily="49" charset="0"/>
+              </a:rPr>
+              <a:t> </a:t>
+            </a:r>
+            <a:r>
+              <a:rPr lang="en-US" b="1" dirty="0" smtClean="0">
+                <a:solidFill>
+                  <a:schemeClr val="bg1"/>
+                </a:solidFill>
+                <a:latin typeface="Courier New" panose="02070309020205020404" pitchFamily="49" charset="0"/>
+                <a:cs typeface="Courier New" panose="02070309020205020404" pitchFamily="49" charset="0"/>
+              </a:rPr>
+              <a:t>   of </a:t>
+            </a:r>
+            <a:r>
+              <a:rPr lang="en-US" b="1" dirty="0">
+                <a:solidFill>
+                  <a:schemeClr val="bg1"/>
+                </a:solidFill>
+                <a:latin typeface="Courier New" panose="02070309020205020404" pitchFamily="49" charset="0"/>
+                <a:cs typeface="Courier New" panose="02070309020205020404" pitchFamily="49" charset="0"/>
+              </a:rPr>
+              <a:t>7 runs, 1 loop each)</a:t>
+            </a:r>
+            <a:endParaRPr lang="nl-BE" b="1" dirty="0">
+              <a:solidFill>
+                <a:schemeClr val="bg1"/>
+              </a:solidFill>
+              <a:latin typeface="Courier New" panose="02070309020205020404" pitchFamily="49" charset="0"/>
+              <a:cs typeface="Courier New" panose="02070309020205020404" pitchFamily="49" charset="0"/>
+            </a:endParaRPr>
+          </a:p>
+          <a:p>
+            <a:r>
+              <a:rPr lang="nl-BE" b="1" dirty="0">
+                <a:solidFill>
+                  <a:srgbClr val="00B050"/>
+                </a:solidFill>
+                <a:latin typeface="Courier New" panose="02070309020205020404" pitchFamily="49" charset="0"/>
+                <a:cs typeface="Courier New" panose="02070309020205020404" pitchFamily="49" charset="0"/>
+              </a:rPr>
+              <a:t>In [4]:</a:t>
+            </a:r>
+            <a:r>
+              <a:rPr lang="nl-BE" b="1" dirty="0">
+                <a:solidFill>
+                  <a:schemeClr val="bg1"/>
+                </a:solidFill>
+                <a:latin typeface="Courier New" panose="02070309020205020404" pitchFamily="49" charset="0"/>
+                <a:cs typeface="Courier New" panose="02070309020205020404" pitchFamily="49" charset="0"/>
+              </a:rPr>
+              <a:t> %timeit </a:t>
+            </a:r>
+            <a:r>
+              <a:rPr lang="nl-BE" b="1" dirty="0" smtClean="0">
+                <a:solidFill>
+                  <a:schemeClr val="bg1"/>
+                </a:solidFill>
+                <a:latin typeface="Courier New" panose="02070309020205020404" pitchFamily="49" charset="0"/>
+                <a:cs typeface="Courier New" panose="02070309020205020404" pitchFamily="49" charset="0"/>
+              </a:rPr>
+              <a:t>primes_pa.primes(1000</a:t>
+            </a:r>
+            <a:r>
+              <a:rPr lang="nl-BE" b="1" dirty="0">
+                <a:solidFill>
+                  <a:schemeClr val="bg1"/>
+                </a:solidFill>
+                <a:latin typeface="Courier New" panose="02070309020205020404" pitchFamily="49" charset="0"/>
+                <a:cs typeface="Courier New" panose="02070309020205020404" pitchFamily="49" charset="0"/>
+              </a:rPr>
+              <a:t>)</a:t>
+            </a:r>
+          </a:p>
+          <a:p>
+            <a:r>
+              <a:rPr lang="en-US" b="1" dirty="0" smtClean="0">
+                <a:solidFill>
+                  <a:srgbClr val="FF0000"/>
+                </a:solidFill>
+                <a:latin typeface="Courier New" panose="02070309020205020404" pitchFamily="49" charset="0"/>
+                <a:cs typeface="Courier New" panose="02070309020205020404" pitchFamily="49" charset="0"/>
+              </a:rPr>
+              <a:t>99.3 </a:t>
+            </a:r>
+            <a:r>
+              <a:rPr lang="en-US" b="1" dirty="0" err="1">
+                <a:solidFill>
+                  <a:srgbClr val="FF0000"/>
+                </a:solidFill>
+                <a:latin typeface="Courier New" panose="02070309020205020404" pitchFamily="49" charset="0"/>
+                <a:cs typeface="Courier New" panose="02070309020205020404" pitchFamily="49" charset="0"/>
+              </a:rPr>
+              <a:t>ms</a:t>
+            </a:r>
+            <a:r>
+              <a:rPr lang="en-US" b="1" dirty="0">
+                <a:solidFill>
+                  <a:schemeClr val="bg1"/>
+                </a:solidFill>
+                <a:latin typeface="Courier New" panose="02070309020205020404" pitchFamily="49" charset="0"/>
+                <a:cs typeface="Courier New" panose="02070309020205020404" pitchFamily="49" charset="0"/>
+              </a:rPr>
+              <a:t> ± 878 µs per loop (mean ± std. </a:t>
+            </a:r>
+            <a:r>
+              <a:rPr lang="en-US" b="1" dirty="0" smtClean="0">
+                <a:solidFill>
+                  <a:schemeClr val="bg1"/>
+                </a:solidFill>
+                <a:latin typeface="Courier New" panose="02070309020205020404" pitchFamily="49" charset="0"/>
+                <a:cs typeface="Courier New" panose="02070309020205020404" pitchFamily="49" charset="0"/>
+              </a:rPr>
+              <a:t>dev.</a:t>
+            </a:r>
+          </a:p>
+          <a:p>
+            <a:r>
+              <a:rPr lang="en-US" b="1" dirty="0">
+                <a:solidFill>
+                  <a:schemeClr val="bg1"/>
+                </a:solidFill>
+                <a:latin typeface="Courier New" panose="02070309020205020404" pitchFamily="49" charset="0"/>
+                <a:cs typeface="Courier New" panose="02070309020205020404" pitchFamily="49" charset="0"/>
+              </a:rPr>
+              <a:t> </a:t>
+            </a:r>
+            <a:r>
+              <a:rPr lang="en-US" b="1" dirty="0" smtClean="0">
+                <a:solidFill>
+                  <a:schemeClr val="bg1"/>
+                </a:solidFill>
+                <a:latin typeface="Courier New" panose="02070309020205020404" pitchFamily="49" charset="0"/>
+                <a:cs typeface="Courier New" panose="02070309020205020404" pitchFamily="49" charset="0"/>
+              </a:rPr>
+              <a:t>   of </a:t>
+            </a:r>
+            <a:r>
+              <a:rPr lang="en-US" b="1" dirty="0">
+                <a:solidFill>
+                  <a:schemeClr val="bg1"/>
+                </a:solidFill>
+                <a:latin typeface="Courier New" panose="02070309020205020404" pitchFamily="49" charset="0"/>
+                <a:cs typeface="Courier New" panose="02070309020205020404" pitchFamily="49" charset="0"/>
+              </a:rPr>
+              <a:t>7 runs, 10 loops each)</a:t>
+            </a:r>
+            <a:endParaRPr lang="en-US" b="1" dirty="0" smtClean="0">
+              <a:solidFill>
+                <a:schemeClr val="bg1"/>
+              </a:solidFill>
+              <a:latin typeface="Courier New" panose="02070309020205020404" pitchFamily="49" charset="0"/>
+              <a:cs typeface="Courier New" panose="02070309020205020404" pitchFamily="49" charset="0"/>
+            </a:endParaRPr>
+          </a:p>
+        </p:txBody>
+      </p:sp>
+      <p:grpSp>
+        <p:nvGrpSpPr>
+          <p:cNvPr id="7" name="Group 6"/>
+          <p:cNvGrpSpPr/>
+          <p:nvPr/>
+        </p:nvGrpSpPr>
+        <p:grpSpPr>
+          <a:xfrm>
+            <a:off x="6858000" y="3200400"/>
+            <a:ext cx="1989593" cy="1066800"/>
+            <a:chOff x="6858000" y="3200400"/>
+            <a:chExt cx="1989593" cy="1066800"/>
+          </a:xfrm>
+        </p:grpSpPr>
+        <p:sp>
+          <p:nvSpPr>
+            <p:cNvPr id="5" name="Curved Left Arrow 4"/>
+            <p:cNvSpPr/>
+            <p:nvPr/>
+          </p:nvSpPr>
+          <p:spPr>
+            <a:xfrm flipV="1">
+              <a:off x="6858000" y="3200400"/>
+              <a:ext cx="533400" cy="1066800"/>
+            </a:xfrm>
+            <a:prstGeom prst="curvedLeftArrow">
+              <a:avLst/>
+            </a:prstGeom>
+            <a:solidFill>
+              <a:srgbClr val="C00000"/>
+            </a:solidFill>
+            <a:ln>
+              <a:solidFill>
+                <a:srgbClr val="C00000"/>
+              </a:solidFill>
+            </a:ln>
+          </p:spPr>
+          <p:style>
+            <a:lnRef idx="2">
+              <a:schemeClr val="accent1">
+                <a:shade val="50000"/>
+              </a:schemeClr>
+            </a:lnRef>
+            <a:fillRef idx="1">
+              <a:schemeClr val="accent1"/>
+            </a:fillRef>
+            <a:effectRef idx="0">
+              <a:schemeClr val="accent1"/>
+            </a:effectRef>
+            <a:fontRef idx="minor">
+              <a:schemeClr val="lt1"/>
+            </a:fontRef>
+          </p:style>
+          <p:txBody>
+            <a:bodyPr rtlCol="0" anchor="ctr"/>
+            <a:lstStyle/>
+            <a:p>
+              <a:pPr algn="ctr"/>
+              <a:endParaRPr lang="nl-BE">
+                <a:solidFill>
+                  <a:schemeClr val="tx1"/>
+                </a:solidFill>
+              </a:endParaRPr>
+            </a:p>
+          </p:txBody>
+        </p:sp>
+        <p:sp>
+          <p:nvSpPr>
+            <p:cNvPr id="6" name="TextBox 5"/>
+            <p:cNvSpPr txBox="1"/>
+            <p:nvPr/>
+          </p:nvSpPr>
+          <p:spPr>
+            <a:xfrm>
+              <a:off x="7467600" y="3562290"/>
+              <a:ext cx="1379993" cy="400110"/>
+            </a:xfrm>
+            <a:prstGeom prst="rect">
+              <a:avLst/>
+            </a:prstGeom>
+            <a:noFill/>
+          </p:spPr>
+          <p:txBody>
+            <a:bodyPr wrap="none" rtlCol="0">
+              <a:spAutoFit/>
+            </a:bodyPr>
+            <a:lstStyle/>
+            <a:p>
+              <a:r>
+                <a:rPr lang="en-US" sz="2000" b="1" dirty="0" smtClean="0">
+                  <a:solidFill>
+                    <a:srgbClr val="C00000"/>
+                  </a:solidFill>
+                </a:rPr>
+                <a:t>1.2</a:t>
+              </a:r>
+              <a:r>
+                <a:rPr lang="en-US" sz="2000" b="1" dirty="0" smtClean="0">
+                  <a:solidFill>
+                    <a:srgbClr val="C00000"/>
+                  </a:solidFill>
+                </a:rPr>
+                <a:t> </a:t>
+              </a:r>
+              <a:r>
+                <a:rPr lang="en-US" sz="2000" b="1" dirty="0" smtClean="0">
+                  <a:solidFill>
+                    <a:srgbClr val="C00000"/>
+                  </a:solidFill>
+                  <a:sym typeface="Symbol"/>
+                </a:rPr>
+                <a:t></a:t>
+              </a:r>
+              <a:r>
+                <a:rPr lang="en-US" sz="2000" b="1" dirty="0" smtClean="0">
+                  <a:solidFill>
+                    <a:srgbClr val="C00000"/>
+                  </a:solidFill>
+                </a:rPr>
+                <a:t> faster</a:t>
+              </a:r>
+              <a:endParaRPr lang="nl-BE" sz="2000" b="1" dirty="0">
+                <a:solidFill>
+                  <a:srgbClr val="C00000"/>
+                </a:solidFill>
+              </a:endParaRPr>
+            </a:p>
+          </p:txBody>
+        </p:sp>
+      </p:grpSp>
+      <p:sp>
+        <p:nvSpPr>
+          <p:cNvPr id="8" name="TextBox 7"/>
+          <p:cNvSpPr txBox="1"/>
+          <p:nvPr/>
+        </p:nvSpPr>
+        <p:spPr>
+          <a:xfrm>
+            <a:off x="1565669" y="4969253"/>
+            <a:ext cx="3575081" cy="830997"/>
+          </a:xfrm>
+          <a:prstGeom prst="rect">
+            <a:avLst/>
+          </a:prstGeom>
+          <a:noFill/>
+          <a:ln>
+            <a:solidFill>
+              <a:schemeClr val="tx1"/>
+            </a:solidFill>
+          </a:ln>
+        </p:spPr>
+        <p:txBody>
+          <a:bodyPr wrap="none" rtlCol="0">
+            <a:spAutoFit/>
+          </a:bodyPr>
+          <a:lstStyle/>
+          <a:p>
+            <a:r>
+              <a:rPr lang="en-US" sz="2400" dirty="0" err="1"/>
+              <a:t>n</a:t>
+            </a:r>
+            <a:r>
+              <a:rPr lang="en-US" sz="2400" dirty="0" err="1" smtClean="0"/>
+              <a:t>umba</a:t>
+            </a:r>
+            <a:r>
+              <a:rPr lang="en-US" sz="2400" dirty="0" smtClean="0"/>
+              <a:t> is just slightly faster</a:t>
+            </a:r>
+            <a:br>
+              <a:rPr lang="en-US" sz="2400" dirty="0" smtClean="0"/>
+            </a:br>
+            <a:r>
+              <a:rPr lang="en-US" sz="2400" dirty="0" smtClean="0"/>
+              <a:t>There be dragons…</a:t>
+            </a:r>
+            <a:endParaRPr lang="en-US" sz="2400" dirty="0" smtClean="0"/>
+          </a:p>
+        </p:txBody>
+      </p:sp>
+    </p:spTree>
+    <p:extLst>
+      <p:ext uri="{BB962C8B-B14F-4D97-AF65-F5344CB8AC3E}">
+        <p14:creationId xmlns:p14="http://schemas.microsoft.com/office/powerpoint/2010/main" val="2455100501"/>
+      </p:ext>
+    </p:extLst>
+  </p:cSld>
+  <p:clrMapOvr>
+    <a:masterClrMapping/>
+  </p:clrMapOvr>
+  <p:timing>
+    <p:tnLst>
+      <p:par>
+        <p:cTn id="1" dur="indefinite" restart="never" nodeType="tmRoot">
+          <p:childTnLst>
+            <p:seq concurrent="1" nextAc="seek">
+              <p:cTn id="2" dur="indefinite" nodeType="mainSeq">
+                <p:childTnLst>
+                  <p:par>
+                    <p:cTn id="3" fill="hold">
+                      <p:stCondLst>
+                        <p:cond delay="indefinite"/>
+                      </p:stCondLst>
+                      <p:childTnLst>
+                        <p:par>
+                          <p:cTn id="4" fill="hold">
+                            <p:stCondLst>
+                              <p:cond delay="0"/>
+                            </p:stCondLst>
+                            <p:childTnLst>
+                              <p:par>
+                                <p:cTn id="5" presetID="1" presetClass="entr" presetSubtype="0" fill="hold" nodeType="clickEffect">
+                                  <p:stCondLst>
+                                    <p:cond delay="0"/>
+                                  </p:stCondLst>
+                                  <p:childTnLst>
+                                    <p:set>
+                                      <p:cBhvr>
+                                        <p:cTn id="6" dur="1" fill="hold">
+                                          <p:stCondLst>
+                                            <p:cond delay="0"/>
+                                          </p:stCondLst>
+                                        </p:cTn>
+                                        <p:tgtEl>
+                                          <p:spTgt spid="7"/>
+                                        </p:tgtEl>
+                                        <p:attrNameLst>
+                                          <p:attrName>style.visibility</p:attrName>
+                                        </p:attrNameLst>
+                                      </p:cBhvr>
+                                      <p:to>
+                                        <p:strVal val="visible"/>
+                                      </p:to>
+                                    </p:set>
+                                  </p:childTnLst>
+                                </p:cTn>
+                              </p:par>
+                            </p:childTnLst>
+                          </p:cTn>
+                        </p:par>
+                      </p:childTnLst>
+                    </p:cTn>
+                  </p:par>
+                  <p:par>
+                    <p:cTn id="7" fill="hold">
+                      <p:stCondLst>
+                        <p:cond delay="indefinite"/>
+                      </p:stCondLst>
+                      <p:childTnLst>
+                        <p:par>
+                          <p:cTn id="8" fill="hold">
+                            <p:stCondLst>
+                              <p:cond delay="0"/>
+                            </p:stCondLst>
+                            <p:childTnLst>
+                              <p:par>
+                                <p:cTn id="9" presetID="1" presetClass="entr" presetSubtype="0" fill="hold" grpId="0" nodeType="clickEffect">
+                                  <p:stCondLst>
+                                    <p:cond delay="0"/>
+                                  </p:stCondLst>
+                                  <p:childTnLst>
+                                    <p:set>
+                                      <p:cBhvr>
+                                        <p:cTn id="10" dur="1" fill="hold">
+                                          <p:stCondLst>
+                                            <p:cond delay="0"/>
+                                          </p:stCondLst>
+                                        </p:cTn>
+                                        <p:tgtEl>
+                                          <p:spTgt spid="8"/>
+                                        </p:tgtEl>
+                                        <p:attrNameLst>
+                                          <p:attrName>style.visibility</p:attrName>
+                                        </p:attrNameLst>
+                                      </p:cBhvr>
+                                      <p:to>
+                                        <p:strVal val="visible"/>
+                                      </p:to>
+                                    </p:set>
+                                  </p:childTnLst>
+                                </p:cTn>
+                              </p:par>
+                            </p:childTnLst>
+                          </p:cTn>
+                        </p:par>
+                      </p:childTnLst>
+                    </p:cTn>
+                  </p:par>
+                </p:childTnLst>
+              </p:cTn>
+              <p:prevCondLst>
+                <p:cond evt="onPrev" delay="0">
+                  <p:tgtEl>
+                    <p:sldTgt/>
+                  </p:tgtEl>
+                </p:cond>
+              </p:prevCondLst>
+              <p:nextCondLst>
+                <p:cond evt="onNext" delay="0">
+                  <p:tgtEl>
+                    <p:sldTgt/>
+                  </p:tgtEl>
+                </p:cond>
+              </p:nextCondLst>
+            </p:seq>
+          </p:childTnLst>
+        </p:cTn>
+      </p:par>
+    </p:tnLst>
+    <p:bldLst>
+      <p:bldP spid="8" grpId="0" animBg="1"/>
     </p:bldLst>
   </p:timing>
 </p:sld>

</xml_diff>

<commit_message>
Add slide on number eager JIT
</commit_message>
<xml_diff>
--- a/Python/python_hpc_numba.pptx
+++ b/Python/python_hpc_numba.pptx
@@ -12,6 +12,7 @@
     <p:sldId id="262" r:id="rId6"/>
     <p:sldId id="263" r:id="rId7"/>
     <p:sldId id="264" r:id="rId8"/>
+    <p:sldId id="265" r:id="rId9"/>
   </p:sldIdLst>
   <p:sldSz cx="9144000" cy="6858000" type="screen4x3"/>
   <p:notesSz cx="6858000" cy="9144000"/>
@@ -7697,7 +7698,7 @@
         <p:spPr>
           <a:xfrm>
             <a:off x="1565669" y="4969253"/>
-            <a:ext cx="3575081" cy="830997"/>
+            <a:ext cx="3625544" cy="830997"/>
           </a:xfrm>
           <a:prstGeom prst="rect">
             <a:avLst/>
@@ -7725,14 +7726,14 @@
             </a:r>
             <a:r>
               <a:rPr lang="en-US" sz="2400" dirty="0" smtClean="0"/>
-              <a:t> is just slightly faster</a:t>
+              <a:t> is just slightly faster,</a:t>
             </a:r>
             <a:br>
               <a:rPr lang="en-US" sz="2400" dirty="0" smtClean="0"/>
             </a:br>
             <a:r>
               <a:rPr lang="en-US" sz="2400" dirty="0" smtClean="0"/>
-              <a:t>There be dragons…</a:t>
+              <a:t>there be dragons…</a:t>
             </a:r>
             <a:endParaRPr lang="en-US" sz="2400" dirty="0" smtClean="0"/>
           </a:p>
@@ -7869,6 +7870,1208 @@
     </p:tnLst>
     <p:bldLst>
       <p:bldP spid="8" grpId="0" animBg="1"/>
+    </p:bldLst>
+  </p:timing>
+</p:sld>
+</file>
+
+<file path=ppt/slides/slide8.xml><?xml version="1.0" encoding="utf-8"?>
+<p:sld xmlns:a="http://schemas.openxmlformats.org/drawingml/2006/main" xmlns:r="http://schemas.openxmlformats.org/officeDocument/2006/relationships" xmlns:p="http://schemas.openxmlformats.org/presentationml/2006/main">
+  <p:cSld>
+    <p:spTree>
+      <p:nvGrpSpPr>
+        <p:cNvPr id="1" name=""/>
+        <p:cNvGrpSpPr/>
+        <p:nvPr/>
+      </p:nvGrpSpPr>
+      <p:grpSpPr>
+        <a:xfrm>
+          <a:off x="0" y="0"/>
+          <a:ext cx="0" cy="0"/>
+          <a:chOff x="0" y="0"/>
+          <a:chExt cx="0" cy="0"/>
+        </a:xfrm>
+      </p:grpSpPr>
+      <p:sp>
+        <p:nvSpPr>
+          <p:cNvPr id="2" name="Title 1"/>
+          <p:cNvSpPr>
+            <a:spLocks noGrp="1"/>
+          </p:cNvSpPr>
+          <p:nvPr>
+            <p:ph type="title"/>
+          </p:nvPr>
+        </p:nvSpPr>
+        <p:spPr/>
+        <p:txBody>
+          <a:bodyPr/>
+          <a:lstStyle/>
+          <a:p>
+            <a:r>
+              <a:rPr lang="en-US" dirty="0" smtClean="0"/>
+              <a:t>Eager JIT</a:t>
+            </a:r>
+            <a:endParaRPr lang="nl-BE" dirty="0"/>
+          </a:p>
+        </p:txBody>
+      </p:sp>
+      <p:sp>
+        <p:nvSpPr>
+          <p:cNvPr id="5" name="Slide Number Placeholder 4"/>
+          <p:cNvSpPr>
+            <a:spLocks noGrp="1"/>
+          </p:cNvSpPr>
+          <p:nvPr>
+            <p:ph type="sldNum" sz="quarter" idx="12"/>
+          </p:nvPr>
+        </p:nvSpPr>
+        <p:spPr/>
+        <p:txBody>
+          <a:bodyPr/>
+          <a:lstStyle/>
+          <a:p>
+            <a:fld id="{B6F15528-21DE-4FAA-801E-634DDDAF4B2B}" type="slidenum">
+              <a:rPr lang="en-US" smtClean="0"/>
+              <a:pPr/>
+              <a:t>8</a:t>
+            </a:fld>
+            <a:endParaRPr lang="en-US"/>
+          </a:p>
+        </p:txBody>
+      </p:sp>
+      <p:grpSp>
+        <p:nvGrpSpPr>
+          <p:cNvPr id="9" name="Group 8"/>
+          <p:cNvGrpSpPr/>
+          <p:nvPr/>
+        </p:nvGrpSpPr>
+        <p:grpSpPr>
+          <a:xfrm>
+            <a:off x="135706" y="1513233"/>
+            <a:ext cx="8457418" cy="2308324"/>
+            <a:chOff x="4951597" y="1371600"/>
+            <a:chExt cx="8457418" cy="2308324"/>
+          </a:xfrm>
+          <a:solidFill>
+            <a:schemeClr val="bg1">
+              <a:lumMod val="85000"/>
+            </a:schemeClr>
+          </a:solidFill>
+        </p:grpSpPr>
+        <p:sp>
+          <p:nvSpPr>
+            <p:cNvPr id="4" name="TextBox 3"/>
+            <p:cNvSpPr txBox="1"/>
+            <p:nvPr/>
+          </p:nvSpPr>
+          <p:spPr>
+            <a:xfrm>
+              <a:off x="4951597" y="1371600"/>
+              <a:ext cx="8454559" cy="2308324"/>
+            </a:xfrm>
+            <a:prstGeom prst="rect">
+              <a:avLst/>
+            </a:prstGeom>
+            <a:grpFill/>
+            <a:ln>
+              <a:solidFill>
+                <a:schemeClr val="tx1"/>
+              </a:solidFill>
+            </a:ln>
+          </p:spPr>
+          <p:txBody>
+            <a:bodyPr wrap="none" rtlCol="0">
+              <a:spAutoFit/>
+            </a:bodyPr>
+            <a:lstStyle/>
+            <a:p>
+              <a:r>
+                <a:rPr lang="nl-BE" sz="1600" dirty="0">
+                  <a:latin typeface="Courier New" panose="02070309020205020404" pitchFamily="49" charset="0"/>
+                  <a:cs typeface="Courier New" panose="02070309020205020404" pitchFamily="49" charset="0"/>
+                </a:rPr>
+                <a:t>from numba import jit</a:t>
+              </a:r>
+            </a:p>
+            <a:p>
+              <a:endParaRPr lang="nl-BE" sz="1600" dirty="0">
+                <a:latin typeface="Courier New" panose="02070309020205020404" pitchFamily="49" charset="0"/>
+                <a:cs typeface="Courier New" panose="02070309020205020404" pitchFamily="49" charset="0"/>
+              </a:endParaRPr>
+            </a:p>
+            <a:p>
+              <a:r>
+                <a:rPr lang="nl-BE" sz="1600" dirty="0">
+                  <a:latin typeface="Courier New" panose="02070309020205020404" pitchFamily="49" charset="0"/>
+                  <a:cs typeface="Courier New" panose="02070309020205020404" pitchFamily="49" charset="0"/>
+                </a:rPr>
+                <a:t>@jit</a:t>
+              </a:r>
+            </a:p>
+            <a:p>
+              <a:r>
+                <a:rPr lang="nl-BE" sz="1600" dirty="0">
+                  <a:latin typeface="Courier New" panose="02070309020205020404" pitchFamily="49" charset="0"/>
+                  <a:cs typeface="Courier New" panose="02070309020205020404" pitchFamily="49" charset="0"/>
+                </a:rPr>
+                <a:t>def julia_set(domain, iterations, max_norm, max_iters):</a:t>
+              </a:r>
+            </a:p>
+            <a:p>
+              <a:r>
+                <a:rPr lang="nl-BE" sz="1600" dirty="0" smtClean="0">
+                  <a:latin typeface="Courier New" panose="02070309020205020404" pitchFamily="49" charset="0"/>
+                  <a:cs typeface="Courier New" panose="02070309020205020404" pitchFamily="49" charset="0"/>
+                </a:rPr>
+                <a:t>    for i, z </a:t>
+              </a:r>
+              <a:r>
+                <a:rPr lang="nl-BE" sz="1600" dirty="0">
+                  <a:latin typeface="Courier New" panose="02070309020205020404" pitchFamily="49" charset="0"/>
+                  <a:cs typeface="Courier New" panose="02070309020205020404" pitchFamily="49" charset="0"/>
+                </a:rPr>
+                <a:t>in </a:t>
+              </a:r>
+              <a:r>
+                <a:rPr lang="nl-BE" sz="1600" dirty="0" smtClean="0">
+                  <a:latin typeface="Courier New" panose="02070309020205020404" pitchFamily="49" charset="0"/>
+                  <a:cs typeface="Courier New" panose="02070309020205020404" pitchFamily="49" charset="0"/>
+                </a:rPr>
+                <a:t>enumerate(domain):</a:t>
+              </a:r>
+              <a:endParaRPr lang="nl-BE" sz="1600" dirty="0">
+                <a:latin typeface="Courier New" panose="02070309020205020404" pitchFamily="49" charset="0"/>
+                <a:cs typeface="Courier New" panose="02070309020205020404" pitchFamily="49" charset="0"/>
+              </a:endParaRPr>
+            </a:p>
+            <a:p>
+              <a:r>
+                <a:rPr lang="nl-BE" sz="1600" dirty="0">
+                  <a:latin typeface="Courier New" panose="02070309020205020404" pitchFamily="49" charset="0"/>
+                  <a:cs typeface="Courier New" panose="02070309020205020404" pitchFamily="49" charset="0"/>
+                </a:rPr>
+                <a:t> </a:t>
+              </a:r>
+              <a:r>
+                <a:rPr lang="nl-BE" sz="1600" dirty="0" smtClean="0">
+                  <a:latin typeface="Courier New" panose="02070309020205020404" pitchFamily="49" charset="0"/>
+                  <a:cs typeface="Courier New" panose="02070309020205020404" pitchFamily="49" charset="0"/>
+                </a:rPr>
+                <a:t>       while </a:t>
+              </a:r>
+              <a:r>
+                <a:rPr lang="nl-BE" sz="1600" dirty="0">
+                  <a:latin typeface="Courier New" panose="02070309020205020404" pitchFamily="49" charset="0"/>
+                  <a:cs typeface="Courier New" panose="02070309020205020404" pitchFamily="49" charset="0"/>
+                </a:rPr>
+                <a:t>(</a:t>
+              </a:r>
+              <a:r>
+                <a:rPr lang="nl-BE" sz="1600" dirty="0" smtClean="0">
+                  <a:latin typeface="Courier New" panose="02070309020205020404" pitchFamily="49" charset="0"/>
+                  <a:cs typeface="Courier New" panose="02070309020205020404" pitchFamily="49" charset="0"/>
+                </a:rPr>
+                <a:t>iterations[i] </a:t>
+              </a:r>
+              <a:r>
+                <a:rPr lang="nl-BE" sz="1600" dirty="0">
+                  <a:latin typeface="Courier New" panose="02070309020205020404" pitchFamily="49" charset="0"/>
+                  <a:cs typeface="Courier New" panose="02070309020205020404" pitchFamily="49" charset="0"/>
+                </a:rPr>
+                <a:t>&lt;= max_iters and</a:t>
+              </a:r>
+            </a:p>
+            <a:p>
+              <a:r>
+                <a:rPr lang="nl-BE" sz="1600" dirty="0">
+                  <a:latin typeface="Courier New" panose="02070309020205020404" pitchFamily="49" charset="0"/>
+                  <a:cs typeface="Courier New" panose="02070309020205020404" pitchFamily="49" charset="0"/>
+                </a:rPr>
+                <a:t>        </a:t>
+              </a:r>
+              <a:r>
+                <a:rPr lang="nl-BE" sz="1600" dirty="0" smtClean="0">
+                  <a:latin typeface="Courier New" panose="02070309020205020404" pitchFamily="49" charset="0"/>
+                  <a:cs typeface="Courier New" panose="02070309020205020404" pitchFamily="49" charset="0"/>
+                </a:rPr>
+                <a:t>       </a:t>
+              </a:r>
+              <a:r>
+                <a:rPr lang="nl-BE" sz="1600" dirty="0">
+                  <a:latin typeface="Courier New" panose="02070309020205020404" pitchFamily="49" charset="0"/>
+                  <a:cs typeface="Courier New" panose="02070309020205020404" pitchFamily="49" charset="0"/>
+                </a:rPr>
+                <a:t>z.real*z.real + z.imag*z.imag &lt;= max_norm*max_norm):</a:t>
+              </a:r>
+            </a:p>
+            <a:p>
+              <a:r>
+                <a:rPr lang="nl-BE" sz="1600" dirty="0" smtClean="0">
+                  <a:latin typeface="Courier New" panose="02070309020205020404" pitchFamily="49" charset="0"/>
+                  <a:cs typeface="Courier New" panose="02070309020205020404" pitchFamily="49" charset="0"/>
+                </a:rPr>
+                <a:t>            </a:t>
+              </a:r>
+              <a:r>
+                <a:rPr lang="nl-BE" sz="1600" dirty="0">
+                  <a:latin typeface="Courier New" panose="02070309020205020404" pitchFamily="49" charset="0"/>
+                  <a:cs typeface="Courier New" panose="02070309020205020404" pitchFamily="49" charset="0"/>
+                </a:rPr>
+                <a:t>z = z**2 - 0.622772 + 0.42193j</a:t>
+              </a:r>
+            </a:p>
+            <a:p>
+              <a:r>
+                <a:rPr lang="nl-BE" sz="1600" dirty="0">
+                  <a:latin typeface="Courier New" panose="02070309020205020404" pitchFamily="49" charset="0"/>
+                  <a:cs typeface="Courier New" panose="02070309020205020404" pitchFamily="49" charset="0"/>
+                </a:rPr>
+                <a:t>    </a:t>
+              </a:r>
+              <a:r>
+                <a:rPr lang="nl-BE" sz="1600" dirty="0" smtClean="0">
+                  <a:latin typeface="Courier New" panose="02070309020205020404" pitchFamily="49" charset="0"/>
+                  <a:cs typeface="Courier New" panose="02070309020205020404" pitchFamily="49" charset="0"/>
+                </a:rPr>
+                <a:t>        iterations[i] </a:t>
+              </a:r>
+              <a:r>
+                <a:rPr lang="nl-BE" sz="1600" dirty="0">
+                  <a:latin typeface="Courier New" panose="02070309020205020404" pitchFamily="49" charset="0"/>
+                  <a:cs typeface="Courier New" panose="02070309020205020404" pitchFamily="49" charset="0"/>
+                </a:rPr>
+                <a:t>+= 1</a:t>
+              </a:r>
+            </a:p>
+          </p:txBody>
+        </p:sp>
+        <p:sp>
+          <p:nvSpPr>
+            <p:cNvPr id="7" name="TextBox 6"/>
+            <p:cNvSpPr txBox="1"/>
+            <p:nvPr/>
+          </p:nvSpPr>
+          <p:spPr>
+            <a:xfrm>
+              <a:off x="12093527" y="3372147"/>
+              <a:ext cx="1315488" cy="307777"/>
+            </a:xfrm>
+            <a:prstGeom prst="rect">
+              <a:avLst/>
+            </a:prstGeom>
+            <a:solidFill>
+              <a:schemeClr val="bg1"/>
+            </a:solidFill>
+            <a:ln>
+              <a:solidFill>
+                <a:schemeClr val="tx1"/>
+              </a:solidFill>
+            </a:ln>
+          </p:spPr>
+          <p:txBody>
+            <a:bodyPr wrap="none" rtlCol="0">
+              <a:spAutoFit/>
+            </a:bodyPr>
+            <a:lstStyle/>
+            <a:p>
+              <a:r>
+                <a:rPr lang="en-US" sz="1400" dirty="0" smtClean="0"/>
+                <a:t>julia_numba.py</a:t>
+              </a:r>
+              <a:endParaRPr lang="nl-BE" sz="1400" dirty="0"/>
+            </a:p>
+          </p:txBody>
+        </p:sp>
+      </p:grpSp>
+      <p:grpSp>
+        <p:nvGrpSpPr>
+          <p:cNvPr id="11" name="Group 10"/>
+          <p:cNvGrpSpPr/>
+          <p:nvPr/>
+        </p:nvGrpSpPr>
+        <p:grpSpPr>
+          <a:xfrm>
+            <a:off x="135705" y="3985507"/>
+            <a:ext cx="8457092" cy="2308324"/>
+            <a:chOff x="4951597" y="1371600"/>
+            <a:chExt cx="8457092" cy="2308324"/>
+          </a:xfrm>
+          <a:solidFill>
+            <a:schemeClr val="bg1">
+              <a:lumMod val="85000"/>
+            </a:schemeClr>
+          </a:solidFill>
+        </p:grpSpPr>
+        <p:sp>
+          <p:nvSpPr>
+            <p:cNvPr id="12" name="TextBox 11"/>
+            <p:cNvSpPr txBox="1"/>
+            <p:nvPr/>
+          </p:nvSpPr>
+          <p:spPr>
+            <a:xfrm>
+              <a:off x="4951597" y="1371600"/>
+              <a:ext cx="8454559" cy="2308324"/>
+            </a:xfrm>
+            <a:prstGeom prst="rect">
+              <a:avLst/>
+            </a:prstGeom>
+            <a:grpFill/>
+            <a:ln>
+              <a:solidFill>
+                <a:schemeClr val="tx1"/>
+              </a:solidFill>
+            </a:ln>
+          </p:spPr>
+          <p:txBody>
+            <a:bodyPr wrap="none" rtlCol="0">
+              <a:spAutoFit/>
+            </a:bodyPr>
+            <a:lstStyle/>
+            <a:p>
+              <a:r>
+                <a:rPr lang="nl-BE" sz="1600" dirty="0">
+                  <a:latin typeface="Courier New" panose="02070309020205020404" pitchFamily="49" charset="0"/>
+                  <a:cs typeface="Courier New" panose="02070309020205020404" pitchFamily="49" charset="0"/>
+                </a:rPr>
+                <a:t>from numba import </a:t>
+              </a:r>
+              <a:r>
+                <a:rPr lang="nl-BE" sz="1600" dirty="0" smtClean="0">
+                  <a:latin typeface="Courier New" panose="02070309020205020404" pitchFamily="49" charset="0"/>
+                  <a:cs typeface="Courier New" panose="02070309020205020404" pitchFamily="49" charset="0"/>
+                </a:rPr>
+                <a:t>jit</a:t>
+              </a:r>
+              <a:r>
+                <a:rPr lang="nl-BE" sz="1600" b="1" dirty="0" smtClean="0">
+                  <a:solidFill>
+                    <a:srgbClr val="C00000"/>
+                  </a:solidFill>
+                  <a:latin typeface="Courier New" panose="02070309020205020404" pitchFamily="49" charset="0"/>
+                  <a:cs typeface="Courier New" panose="02070309020205020404" pitchFamily="49" charset="0"/>
+                </a:rPr>
+                <a:t>, void, int32, float64, complex128</a:t>
+              </a:r>
+              <a:endParaRPr lang="nl-BE" sz="1600" b="1" dirty="0">
+                <a:solidFill>
+                  <a:srgbClr val="C00000"/>
+                </a:solidFill>
+                <a:latin typeface="Courier New" panose="02070309020205020404" pitchFamily="49" charset="0"/>
+                <a:cs typeface="Courier New" panose="02070309020205020404" pitchFamily="49" charset="0"/>
+              </a:endParaRPr>
+            </a:p>
+            <a:p>
+              <a:endParaRPr lang="nl-BE" sz="1600" dirty="0">
+                <a:latin typeface="Courier New" panose="02070309020205020404" pitchFamily="49" charset="0"/>
+                <a:cs typeface="Courier New" panose="02070309020205020404" pitchFamily="49" charset="0"/>
+              </a:endParaRPr>
+            </a:p>
+            <a:p>
+              <a:r>
+                <a:rPr lang="nl-BE" sz="1600" dirty="0">
+                  <a:latin typeface="Courier New" panose="02070309020205020404" pitchFamily="49" charset="0"/>
+                  <a:cs typeface="Courier New" panose="02070309020205020404" pitchFamily="49" charset="0"/>
+                </a:rPr>
+                <a:t>@</a:t>
+              </a:r>
+              <a:r>
+                <a:rPr lang="nl-BE" sz="1600" dirty="0" smtClean="0">
+                  <a:latin typeface="Courier New" panose="02070309020205020404" pitchFamily="49" charset="0"/>
+                  <a:cs typeface="Courier New" panose="02070309020205020404" pitchFamily="49" charset="0"/>
+                </a:rPr>
+                <a:t>jit</a:t>
+              </a:r>
+              <a:r>
+                <a:rPr lang="nl-BE" sz="1600" b="1" dirty="0" smtClean="0">
+                  <a:solidFill>
+                    <a:srgbClr val="C00000"/>
+                  </a:solidFill>
+                  <a:latin typeface="Courier New" panose="02070309020205020404" pitchFamily="49" charset="0"/>
+                  <a:cs typeface="Courier New" panose="02070309020205020404" pitchFamily="49" charset="0"/>
+                </a:rPr>
+                <a:t>(void(complex128[:], int32[:], float64, int32))</a:t>
+              </a:r>
+              <a:endParaRPr lang="nl-BE" sz="1600" b="1" dirty="0">
+                <a:solidFill>
+                  <a:srgbClr val="C00000"/>
+                </a:solidFill>
+                <a:latin typeface="Courier New" panose="02070309020205020404" pitchFamily="49" charset="0"/>
+                <a:cs typeface="Courier New" panose="02070309020205020404" pitchFamily="49" charset="0"/>
+              </a:endParaRPr>
+            </a:p>
+            <a:p>
+              <a:r>
+                <a:rPr lang="nl-BE" sz="1600" dirty="0">
+                  <a:latin typeface="Courier New" panose="02070309020205020404" pitchFamily="49" charset="0"/>
+                  <a:cs typeface="Courier New" panose="02070309020205020404" pitchFamily="49" charset="0"/>
+                </a:rPr>
+                <a:t>def julia_set(domain, iterations, max_norm, max_iters):</a:t>
+              </a:r>
+            </a:p>
+            <a:p>
+              <a:r>
+                <a:rPr lang="nl-BE" sz="1600" dirty="0" smtClean="0">
+                  <a:latin typeface="Courier New" panose="02070309020205020404" pitchFamily="49" charset="0"/>
+                  <a:cs typeface="Courier New" panose="02070309020205020404" pitchFamily="49" charset="0"/>
+                </a:rPr>
+                <a:t>    for i, z </a:t>
+              </a:r>
+              <a:r>
+                <a:rPr lang="nl-BE" sz="1600" dirty="0">
+                  <a:latin typeface="Courier New" panose="02070309020205020404" pitchFamily="49" charset="0"/>
+                  <a:cs typeface="Courier New" panose="02070309020205020404" pitchFamily="49" charset="0"/>
+                </a:rPr>
+                <a:t>in </a:t>
+              </a:r>
+              <a:r>
+                <a:rPr lang="nl-BE" sz="1600" dirty="0" smtClean="0">
+                  <a:latin typeface="Courier New" panose="02070309020205020404" pitchFamily="49" charset="0"/>
+                  <a:cs typeface="Courier New" panose="02070309020205020404" pitchFamily="49" charset="0"/>
+                </a:rPr>
+                <a:t>enumerate(domain):</a:t>
+              </a:r>
+              <a:endParaRPr lang="nl-BE" sz="1600" dirty="0">
+                <a:latin typeface="Courier New" panose="02070309020205020404" pitchFamily="49" charset="0"/>
+                <a:cs typeface="Courier New" panose="02070309020205020404" pitchFamily="49" charset="0"/>
+              </a:endParaRPr>
+            </a:p>
+            <a:p>
+              <a:r>
+                <a:rPr lang="nl-BE" sz="1600" dirty="0">
+                  <a:latin typeface="Courier New" panose="02070309020205020404" pitchFamily="49" charset="0"/>
+                  <a:cs typeface="Courier New" panose="02070309020205020404" pitchFamily="49" charset="0"/>
+                </a:rPr>
+                <a:t> </a:t>
+              </a:r>
+              <a:r>
+                <a:rPr lang="nl-BE" sz="1600" dirty="0" smtClean="0">
+                  <a:latin typeface="Courier New" panose="02070309020205020404" pitchFamily="49" charset="0"/>
+                  <a:cs typeface="Courier New" panose="02070309020205020404" pitchFamily="49" charset="0"/>
+                </a:rPr>
+                <a:t>       while </a:t>
+              </a:r>
+              <a:r>
+                <a:rPr lang="nl-BE" sz="1600" dirty="0">
+                  <a:latin typeface="Courier New" panose="02070309020205020404" pitchFamily="49" charset="0"/>
+                  <a:cs typeface="Courier New" panose="02070309020205020404" pitchFamily="49" charset="0"/>
+                </a:rPr>
+                <a:t>(</a:t>
+              </a:r>
+              <a:r>
+                <a:rPr lang="nl-BE" sz="1600" dirty="0" smtClean="0">
+                  <a:latin typeface="Courier New" panose="02070309020205020404" pitchFamily="49" charset="0"/>
+                  <a:cs typeface="Courier New" panose="02070309020205020404" pitchFamily="49" charset="0"/>
+                </a:rPr>
+                <a:t>iterations[i] </a:t>
+              </a:r>
+              <a:r>
+                <a:rPr lang="nl-BE" sz="1600" dirty="0">
+                  <a:latin typeface="Courier New" panose="02070309020205020404" pitchFamily="49" charset="0"/>
+                  <a:cs typeface="Courier New" panose="02070309020205020404" pitchFamily="49" charset="0"/>
+                </a:rPr>
+                <a:t>&lt;= max_iters and</a:t>
+              </a:r>
+            </a:p>
+            <a:p>
+              <a:r>
+                <a:rPr lang="nl-BE" sz="1600" dirty="0">
+                  <a:latin typeface="Courier New" panose="02070309020205020404" pitchFamily="49" charset="0"/>
+                  <a:cs typeface="Courier New" panose="02070309020205020404" pitchFamily="49" charset="0"/>
+                </a:rPr>
+                <a:t>        </a:t>
+              </a:r>
+              <a:r>
+                <a:rPr lang="nl-BE" sz="1600" dirty="0" smtClean="0">
+                  <a:latin typeface="Courier New" panose="02070309020205020404" pitchFamily="49" charset="0"/>
+                  <a:cs typeface="Courier New" panose="02070309020205020404" pitchFamily="49" charset="0"/>
+                </a:rPr>
+                <a:t>       </a:t>
+              </a:r>
+              <a:r>
+                <a:rPr lang="nl-BE" sz="1600" dirty="0">
+                  <a:latin typeface="Courier New" panose="02070309020205020404" pitchFamily="49" charset="0"/>
+                  <a:cs typeface="Courier New" panose="02070309020205020404" pitchFamily="49" charset="0"/>
+                </a:rPr>
+                <a:t>z.real*z.real + z.imag*z.imag &lt;= max_norm*max_norm):</a:t>
+              </a:r>
+            </a:p>
+            <a:p>
+              <a:r>
+                <a:rPr lang="nl-BE" sz="1600" dirty="0" smtClean="0">
+                  <a:latin typeface="Courier New" panose="02070309020205020404" pitchFamily="49" charset="0"/>
+                  <a:cs typeface="Courier New" panose="02070309020205020404" pitchFamily="49" charset="0"/>
+                </a:rPr>
+                <a:t>            </a:t>
+              </a:r>
+              <a:r>
+                <a:rPr lang="nl-BE" sz="1600" dirty="0">
+                  <a:latin typeface="Courier New" panose="02070309020205020404" pitchFamily="49" charset="0"/>
+                  <a:cs typeface="Courier New" panose="02070309020205020404" pitchFamily="49" charset="0"/>
+                </a:rPr>
+                <a:t>z = z**2 - 0.622772 + 0.42193j</a:t>
+              </a:r>
+            </a:p>
+            <a:p>
+              <a:r>
+                <a:rPr lang="nl-BE" sz="1600" dirty="0">
+                  <a:latin typeface="Courier New" panose="02070309020205020404" pitchFamily="49" charset="0"/>
+                  <a:cs typeface="Courier New" panose="02070309020205020404" pitchFamily="49" charset="0"/>
+                </a:rPr>
+                <a:t>    </a:t>
+              </a:r>
+              <a:r>
+                <a:rPr lang="nl-BE" sz="1600" dirty="0" smtClean="0">
+                  <a:latin typeface="Courier New" panose="02070309020205020404" pitchFamily="49" charset="0"/>
+                  <a:cs typeface="Courier New" panose="02070309020205020404" pitchFamily="49" charset="0"/>
+                </a:rPr>
+                <a:t>        iterations[i] </a:t>
+              </a:r>
+              <a:r>
+                <a:rPr lang="nl-BE" sz="1600" dirty="0">
+                  <a:latin typeface="Courier New" panose="02070309020205020404" pitchFamily="49" charset="0"/>
+                  <a:cs typeface="Courier New" panose="02070309020205020404" pitchFamily="49" charset="0"/>
+                </a:rPr>
+                <a:t>+= 1</a:t>
+              </a:r>
+            </a:p>
+          </p:txBody>
+        </p:sp>
+        <p:sp>
+          <p:nvSpPr>
+            <p:cNvPr id="13" name="TextBox 12"/>
+            <p:cNvSpPr txBox="1"/>
+            <p:nvPr/>
+          </p:nvSpPr>
+          <p:spPr>
+            <a:xfrm>
+              <a:off x="11609414" y="3372147"/>
+              <a:ext cx="1799275" cy="307777"/>
+            </a:xfrm>
+            <a:prstGeom prst="rect">
+              <a:avLst/>
+            </a:prstGeom>
+            <a:solidFill>
+              <a:schemeClr val="bg1"/>
+            </a:solidFill>
+            <a:ln>
+              <a:solidFill>
+                <a:schemeClr val="tx1"/>
+              </a:solidFill>
+            </a:ln>
+          </p:spPr>
+          <p:txBody>
+            <a:bodyPr wrap="none" rtlCol="0">
+              <a:spAutoFit/>
+            </a:bodyPr>
+            <a:lstStyle/>
+            <a:p>
+              <a:r>
+                <a:rPr lang="en-US" sz="1400" dirty="0" smtClean="0"/>
+                <a:t>julia_numba_eager.py</a:t>
+              </a:r>
+              <a:endParaRPr lang="nl-BE" sz="1400" dirty="0"/>
+            </a:p>
+          </p:txBody>
+        </p:sp>
+      </p:grpSp>
+      <p:grpSp>
+        <p:nvGrpSpPr>
+          <p:cNvPr id="17" name="Group 16"/>
+          <p:cNvGrpSpPr/>
+          <p:nvPr/>
+        </p:nvGrpSpPr>
+        <p:grpSpPr>
+          <a:xfrm>
+            <a:off x="6574971" y="4260813"/>
+            <a:ext cx="2467634" cy="646331"/>
+            <a:chOff x="3043431" y="140677"/>
+            <a:chExt cx="2467634" cy="646331"/>
+          </a:xfrm>
+        </p:grpSpPr>
+        <p:sp>
+          <p:nvSpPr>
+            <p:cNvPr id="14" name="TextBox 13"/>
+            <p:cNvSpPr txBox="1"/>
+            <p:nvPr/>
+          </p:nvSpPr>
+          <p:spPr>
+            <a:xfrm>
+              <a:off x="3579446" y="140677"/>
+              <a:ext cx="1931619" cy="646331"/>
+            </a:xfrm>
+            <a:prstGeom prst="rect">
+              <a:avLst/>
+            </a:prstGeom>
+            <a:solidFill>
+              <a:schemeClr val="bg1"/>
+            </a:solidFill>
+            <a:ln>
+              <a:solidFill>
+                <a:srgbClr val="0070C0"/>
+              </a:solidFill>
+            </a:ln>
+          </p:spPr>
+          <p:txBody>
+            <a:bodyPr wrap="none" rtlCol="0">
+              <a:spAutoFit/>
+            </a:bodyPr>
+            <a:lstStyle/>
+            <a:p>
+              <a:r>
+                <a:rPr lang="en-US" dirty="0" smtClean="0">
+                  <a:solidFill>
+                    <a:srgbClr val="0070C0"/>
+                  </a:solidFill>
+                </a:rPr>
+                <a:t>Function signature</a:t>
+              </a:r>
+              <a:br>
+                <a:rPr lang="en-US" dirty="0" smtClean="0">
+                  <a:solidFill>
+                    <a:srgbClr val="0070C0"/>
+                  </a:solidFill>
+                </a:rPr>
+              </a:br>
+              <a:r>
+                <a:rPr lang="en-US" dirty="0" smtClean="0">
+                  <a:solidFill>
+                    <a:srgbClr val="0070C0"/>
+                  </a:solidFill>
+                </a:rPr>
+                <a:t>specification</a:t>
+              </a:r>
+              <a:endParaRPr lang="en-US" dirty="0">
+                <a:solidFill>
+                  <a:srgbClr val="0070C0"/>
+                </a:solidFill>
+              </a:endParaRPr>
+            </a:p>
+          </p:txBody>
+        </p:sp>
+        <p:cxnSp>
+          <p:nvCxnSpPr>
+            <p:cNvPr id="16" name="Straight Arrow Connector 15"/>
+            <p:cNvCxnSpPr>
+              <a:stCxn id="14" idx="1"/>
+            </p:cNvCxnSpPr>
+            <p:nvPr/>
+          </p:nvCxnSpPr>
+          <p:spPr>
+            <a:xfrm flipH="1">
+              <a:off x="3043431" y="463843"/>
+              <a:ext cx="536015" cy="21295"/>
+            </a:xfrm>
+            <a:prstGeom prst="straightConnector1">
+              <a:avLst/>
+            </a:prstGeom>
+            <a:ln w="12700">
+              <a:solidFill>
+                <a:srgbClr val="0070C0"/>
+              </a:solidFill>
+              <a:tailEnd type="stealth" w="lg" len="lg"/>
+            </a:ln>
+          </p:spPr>
+          <p:style>
+            <a:lnRef idx="1">
+              <a:schemeClr val="accent1"/>
+            </a:lnRef>
+            <a:fillRef idx="0">
+              <a:schemeClr val="accent1"/>
+            </a:fillRef>
+            <a:effectRef idx="0">
+              <a:schemeClr val="accent1"/>
+            </a:effectRef>
+            <a:fontRef idx="minor">
+              <a:schemeClr val="tx1"/>
+            </a:fontRef>
+          </p:style>
+        </p:cxnSp>
+      </p:grpSp>
+      <p:sp>
+        <p:nvSpPr>
+          <p:cNvPr id="20" name="TextBox 19"/>
+          <p:cNvSpPr txBox="1"/>
+          <p:nvPr/>
+        </p:nvSpPr>
+        <p:spPr>
+          <a:xfrm>
+            <a:off x="4727418" y="6321366"/>
+            <a:ext cx="2939651" cy="400110"/>
+          </a:xfrm>
+          <a:prstGeom prst="rect">
+            <a:avLst/>
+          </a:prstGeom>
+          <a:noFill/>
+        </p:spPr>
+        <p:txBody>
+          <a:bodyPr wrap="none" rtlCol="0">
+            <a:spAutoFit/>
+          </a:bodyPr>
+          <a:lstStyle/>
+          <a:p>
+            <a:r>
+              <a:rPr lang="en-US" sz="2000" b="1" dirty="0" smtClean="0">
+                <a:solidFill>
+                  <a:srgbClr val="C00000"/>
+                </a:solidFill>
+              </a:rPr>
+              <a:t>2195 </a:t>
+            </a:r>
+            <a:r>
+              <a:rPr lang="en-US" sz="2000" b="1" dirty="0" smtClean="0">
+                <a:solidFill>
+                  <a:srgbClr val="C00000"/>
+                </a:solidFill>
+                <a:sym typeface="Symbol"/>
+              </a:rPr>
+              <a:t></a:t>
+            </a:r>
+            <a:r>
+              <a:rPr lang="en-US" sz="2000" b="1" dirty="0" smtClean="0">
+                <a:solidFill>
+                  <a:srgbClr val="C00000"/>
+                </a:solidFill>
+              </a:rPr>
+              <a:t> </a:t>
+            </a:r>
+            <a:r>
+              <a:rPr lang="en-US" sz="2000" b="1" dirty="0" smtClean="0">
+                <a:solidFill>
+                  <a:srgbClr val="C00000"/>
+                </a:solidFill>
+              </a:rPr>
+              <a:t>faster than Python</a:t>
+            </a:r>
+            <a:endParaRPr lang="nl-BE" sz="2000" b="1" dirty="0">
+              <a:solidFill>
+                <a:srgbClr val="C00000"/>
+              </a:solidFill>
+            </a:endParaRPr>
+          </a:p>
+        </p:txBody>
+      </p:sp>
+      <p:sp>
+        <p:nvSpPr>
+          <p:cNvPr id="21" name="TextBox 20"/>
+          <p:cNvSpPr txBox="1"/>
+          <p:nvPr/>
+        </p:nvSpPr>
+        <p:spPr>
+          <a:xfrm>
+            <a:off x="4857261" y="1087861"/>
+            <a:ext cx="2809808" cy="400110"/>
+          </a:xfrm>
+          <a:prstGeom prst="rect">
+            <a:avLst/>
+          </a:prstGeom>
+          <a:noFill/>
+        </p:spPr>
+        <p:txBody>
+          <a:bodyPr wrap="none" rtlCol="0">
+            <a:spAutoFit/>
+          </a:bodyPr>
+          <a:lstStyle/>
+          <a:p>
+            <a:r>
+              <a:rPr lang="en-US" sz="2000" b="1" dirty="0" smtClean="0">
+                <a:solidFill>
+                  <a:srgbClr val="C00000"/>
+                </a:solidFill>
+              </a:rPr>
+              <a:t>912 </a:t>
+            </a:r>
+            <a:r>
+              <a:rPr lang="en-US" sz="2000" b="1" dirty="0" smtClean="0">
+                <a:solidFill>
+                  <a:srgbClr val="C00000"/>
+                </a:solidFill>
+                <a:sym typeface="Symbol"/>
+              </a:rPr>
+              <a:t></a:t>
+            </a:r>
+            <a:r>
+              <a:rPr lang="en-US" sz="2000" b="1" dirty="0" smtClean="0">
+                <a:solidFill>
+                  <a:srgbClr val="C00000"/>
+                </a:solidFill>
+              </a:rPr>
+              <a:t> </a:t>
+            </a:r>
+            <a:r>
+              <a:rPr lang="en-US" sz="2000" b="1" dirty="0" smtClean="0">
+                <a:solidFill>
+                  <a:srgbClr val="C00000"/>
+                </a:solidFill>
+              </a:rPr>
+              <a:t>faster than Python</a:t>
+            </a:r>
+            <a:endParaRPr lang="nl-BE" sz="2000" b="1" dirty="0">
+              <a:solidFill>
+                <a:srgbClr val="C00000"/>
+              </a:solidFill>
+            </a:endParaRPr>
+          </a:p>
+        </p:txBody>
+      </p:sp>
+      <p:grpSp>
+        <p:nvGrpSpPr>
+          <p:cNvPr id="22" name="Group 21"/>
+          <p:cNvGrpSpPr/>
+          <p:nvPr/>
+        </p:nvGrpSpPr>
+        <p:grpSpPr>
+          <a:xfrm>
+            <a:off x="128368" y="2974385"/>
+            <a:ext cx="769763" cy="1066800"/>
+            <a:chOff x="6513537" y="3200400"/>
+            <a:chExt cx="769763" cy="1066800"/>
+          </a:xfrm>
+        </p:grpSpPr>
+        <p:sp>
+          <p:nvSpPr>
+            <p:cNvPr id="23" name="Curved Left Arrow 22"/>
+            <p:cNvSpPr/>
+            <p:nvPr/>
+          </p:nvSpPr>
+          <p:spPr>
+            <a:xfrm>
+              <a:off x="6858000" y="3200400"/>
+              <a:ext cx="386861" cy="1066800"/>
+            </a:xfrm>
+            <a:prstGeom prst="curvedLeftArrow">
+              <a:avLst/>
+            </a:prstGeom>
+            <a:solidFill>
+              <a:srgbClr val="C00000"/>
+            </a:solidFill>
+            <a:ln>
+              <a:solidFill>
+                <a:srgbClr val="C00000"/>
+              </a:solidFill>
+            </a:ln>
+          </p:spPr>
+          <p:style>
+            <a:lnRef idx="2">
+              <a:schemeClr val="accent1">
+                <a:shade val="50000"/>
+              </a:schemeClr>
+            </a:lnRef>
+            <a:fillRef idx="1">
+              <a:schemeClr val="accent1"/>
+            </a:fillRef>
+            <a:effectRef idx="0">
+              <a:schemeClr val="accent1"/>
+            </a:effectRef>
+            <a:fontRef idx="minor">
+              <a:schemeClr val="lt1"/>
+            </a:fontRef>
+          </p:style>
+          <p:txBody>
+            <a:bodyPr rtlCol="0" anchor="ctr"/>
+            <a:lstStyle/>
+            <a:p>
+              <a:pPr algn="ctr"/>
+              <a:endParaRPr lang="nl-BE">
+                <a:solidFill>
+                  <a:schemeClr val="tx1"/>
+                </a:solidFill>
+              </a:endParaRPr>
+            </a:p>
+          </p:txBody>
+        </p:sp>
+        <p:sp>
+          <p:nvSpPr>
+            <p:cNvPr id="24" name="TextBox 23"/>
+            <p:cNvSpPr txBox="1"/>
+            <p:nvPr/>
+          </p:nvSpPr>
+          <p:spPr>
+            <a:xfrm>
+              <a:off x="6513537" y="3533745"/>
+              <a:ext cx="769763" cy="707886"/>
+            </a:xfrm>
+            <a:prstGeom prst="rect">
+              <a:avLst/>
+            </a:prstGeom>
+            <a:noFill/>
+          </p:spPr>
+          <p:txBody>
+            <a:bodyPr wrap="none" rtlCol="0">
+              <a:spAutoFit/>
+            </a:bodyPr>
+            <a:lstStyle/>
+            <a:p>
+              <a:r>
+                <a:rPr lang="en-US" sz="2000" b="1" dirty="0" smtClean="0">
+                  <a:solidFill>
+                    <a:srgbClr val="C00000"/>
+                  </a:solidFill>
+                </a:rPr>
+                <a:t>2.4</a:t>
+              </a:r>
+              <a:r>
+                <a:rPr lang="en-US" sz="2000" b="1" dirty="0" smtClean="0">
+                  <a:solidFill>
+                    <a:srgbClr val="C00000"/>
+                  </a:solidFill>
+                </a:rPr>
+                <a:t> </a:t>
+              </a:r>
+              <a:r>
+                <a:rPr lang="en-US" sz="2000" b="1" dirty="0" smtClean="0">
+                  <a:solidFill>
+                    <a:srgbClr val="C00000"/>
+                  </a:solidFill>
+                  <a:sym typeface="Symbol"/>
+                </a:rPr>
+                <a:t></a:t>
+              </a:r>
+              <a:r>
+                <a:rPr lang="en-US" sz="2000" b="1" dirty="0" smtClean="0">
+                  <a:solidFill>
+                    <a:srgbClr val="C00000"/>
+                  </a:solidFill>
+                </a:rPr>
+                <a:t> </a:t>
+              </a:r>
+              <a:endParaRPr lang="en-US" sz="2000" b="1" dirty="0" smtClean="0">
+                <a:solidFill>
+                  <a:srgbClr val="C00000"/>
+                </a:solidFill>
+              </a:endParaRPr>
+            </a:p>
+            <a:p>
+              <a:endParaRPr lang="nl-BE" sz="2000" b="1" dirty="0">
+                <a:solidFill>
+                  <a:srgbClr val="C00000"/>
+                </a:solidFill>
+              </a:endParaRPr>
+            </a:p>
+          </p:txBody>
+        </p:sp>
+      </p:grpSp>
+    </p:spTree>
+    <p:extLst>
+      <p:ext uri="{BB962C8B-B14F-4D97-AF65-F5344CB8AC3E}">
+        <p14:creationId xmlns:p14="http://schemas.microsoft.com/office/powerpoint/2010/main" val="783195307"/>
+      </p:ext>
+    </p:extLst>
+  </p:cSld>
+  <p:clrMapOvr>
+    <a:masterClrMapping/>
+  </p:clrMapOvr>
+  <p:timing>
+    <p:tnLst>
+      <p:par>
+        <p:cTn id="1" dur="indefinite" restart="never" nodeType="tmRoot">
+          <p:childTnLst>
+            <p:seq concurrent="1" nextAc="seek">
+              <p:cTn id="2" dur="indefinite" nodeType="mainSeq">
+                <p:childTnLst>
+                  <p:par>
+                    <p:cTn id="3" fill="hold">
+                      <p:stCondLst>
+                        <p:cond delay="indefinite"/>
+                      </p:stCondLst>
+                      <p:childTnLst>
+                        <p:par>
+                          <p:cTn id="4" fill="hold">
+                            <p:stCondLst>
+                              <p:cond delay="0"/>
+                            </p:stCondLst>
+                            <p:childTnLst>
+                              <p:par>
+                                <p:cTn id="5" presetID="1" presetClass="entr" presetSubtype="0" fill="hold" nodeType="clickEffect">
+                                  <p:stCondLst>
+                                    <p:cond delay="0"/>
+                                  </p:stCondLst>
+                                  <p:childTnLst>
+                                    <p:set>
+                                      <p:cBhvr>
+                                        <p:cTn id="6" dur="1" fill="hold">
+                                          <p:stCondLst>
+                                            <p:cond delay="0"/>
+                                          </p:stCondLst>
+                                        </p:cTn>
+                                        <p:tgtEl>
+                                          <p:spTgt spid="11"/>
+                                        </p:tgtEl>
+                                        <p:attrNameLst>
+                                          <p:attrName>style.visibility</p:attrName>
+                                        </p:attrNameLst>
+                                      </p:cBhvr>
+                                      <p:to>
+                                        <p:strVal val="visible"/>
+                                      </p:to>
+                                    </p:set>
+                                  </p:childTnLst>
+                                </p:cTn>
+                              </p:par>
+                            </p:childTnLst>
+                          </p:cTn>
+                        </p:par>
+                      </p:childTnLst>
+                    </p:cTn>
+                  </p:par>
+                  <p:par>
+                    <p:cTn id="7" fill="hold">
+                      <p:stCondLst>
+                        <p:cond delay="indefinite"/>
+                      </p:stCondLst>
+                      <p:childTnLst>
+                        <p:par>
+                          <p:cTn id="8" fill="hold">
+                            <p:stCondLst>
+                              <p:cond delay="0"/>
+                            </p:stCondLst>
+                            <p:childTnLst>
+                              <p:par>
+                                <p:cTn id="9" presetID="1" presetClass="entr" presetSubtype="0" fill="hold" nodeType="clickEffect">
+                                  <p:stCondLst>
+                                    <p:cond delay="0"/>
+                                  </p:stCondLst>
+                                  <p:childTnLst>
+                                    <p:set>
+                                      <p:cBhvr>
+                                        <p:cTn id="10" dur="1" fill="hold">
+                                          <p:stCondLst>
+                                            <p:cond delay="0"/>
+                                          </p:stCondLst>
+                                        </p:cTn>
+                                        <p:tgtEl>
+                                          <p:spTgt spid="17"/>
+                                        </p:tgtEl>
+                                        <p:attrNameLst>
+                                          <p:attrName>style.visibility</p:attrName>
+                                        </p:attrNameLst>
+                                      </p:cBhvr>
+                                      <p:to>
+                                        <p:strVal val="visible"/>
+                                      </p:to>
+                                    </p:set>
+                                  </p:childTnLst>
+                                </p:cTn>
+                              </p:par>
+                            </p:childTnLst>
+                          </p:cTn>
+                        </p:par>
+                      </p:childTnLst>
+                    </p:cTn>
+                  </p:par>
+                  <p:par>
+                    <p:cTn id="11" fill="hold">
+                      <p:stCondLst>
+                        <p:cond delay="indefinite"/>
+                      </p:stCondLst>
+                      <p:childTnLst>
+                        <p:par>
+                          <p:cTn id="12" fill="hold">
+                            <p:stCondLst>
+                              <p:cond delay="0"/>
+                            </p:stCondLst>
+                            <p:childTnLst>
+                              <p:par>
+                                <p:cTn id="13" presetID="1" presetClass="entr" presetSubtype="0" fill="hold" nodeType="clickEffect">
+                                  <p:stCondLst>
+                                    <p:cond delay="0"/>
+                                  </p:stCondLst>
+                                  <p:childTnLst>
+                                    <p:set>
+                                      <p:cBhvr>
+                                        <p:cTn id="14" dur="1" fill="hold">
+                                          <p:stCondLst>
+                                            <p:cond delay="0"/>
+                                          </p:stCondLst>
+                                        </p:cTn>
+                                        <p:tgtEl>
+                                          <p:spTgt spid="22"/>
+                                        </p:tgtEl>
+                                        <p:attrNameLst>
+                                          <p:attrName>style.visibility</p:attrName>
+                                        </p:attrNameLst>
+                                      </p:cBhvr>
+                                      <p:to>
+                                        <p:strVal val="visible"/>
+                                      </p:to>
+                                    </p:set>
+                                  </p:childTnLst>
+                                </p:cTn>
+                              </p:par>
+                            </p:childTnLst>
+                          </p:cTn>
+                        </p:par>
+                      </p:childTnLst>
+                    </p:cTn>
+                  </p:par>
+                  <p:par>
+                    <p:cTn id="15" fill="hold">
+                      <p:stCondLst>
+                        <p:cond delay="indefinite"/>
+                      </p:stCondLst>
+                      <p:childTnLst>
+                        <p:par>
+                          <p:cTn id="16" fill="hold">
+                            <p:stCondLst>
+                              <p:cond delay="0"/>
+                            </p:stCondLst>
+                            <p:childTnLst>
+                              <p:par>
+                                <p:cTn id="17" presetID="1" presetClass="entr" presetSubtype="0" fill="hold" grpId="0" nodeType="clickEffect">
+                                  <p:stCondLst>
+                                    <p:cond delay="0"/>
+                                  </p:stCondLst>
+                                  <p:childTnLst>
+                                    <p:set>
+                                      <p:cBhvr>
+                                        <p:cTn id="18" dur="1" fill="hold">
+                                          <p:stCondLst>
+                                            <p:cond delay="0"/>
+                                          </p:stCondLst>
+                                        </p:cTn>
+                                        <p:tgtEl>
+                                          <p:spTgt spid="20"/>
+                                        </p:tgtEl>
+                                        <p:attrNameLst>
+                                          <p:attrName>style.visibility</p:attrName>
+                                        </p:attrNameLst>
+                                      </p:cBhvr>
+                                      <p:to>
+                                        <p:strVal val="visible"/>
+                                      </p:to>
+                                    </p:set>
+                                  </p:childTnLst>
+                                </p:cTn>
+                              </p:par>
+                            </p:childTnLst>
+                          </p:cTn>
+                        </p:par>
+                      </p:childTnLst>
+                    </p:cTn>
+                  </p:par>
+                </p:childTnLst>
+              </p:cTn>
+              <p:prevCondLst>
+                <p:cond evt="onPrev" delay="0">
+                  <p:tgtEl>
+                    <p:sldTgt/>
+                  </p:tgtEl>
+                </p:cond>
+              </p:prevCondLst>
+              <p:nextCondLst>
+                <p:cond evt="onNext" delay="0">
+                  <p:tgtEl>
+                    <p:sldTgt/>
+                  </p:tgtEl>
+                </p:cond>
+              </p:nextCondLst>
+            </p:seq>
+          </p:childTnLst>
+        </p:cTn>
+      </p:par>
+    </p:tnLst>
+    <p:bldLst>
+      <p:bldP spid="20" grpId="0"/>
     </p:bldLst>
   </p:timing>
 </p:sld>

</xml_diff>